<commit_message>
PWM/PPM Left/Right, UART update
- created possiblity to use PWM, PPM input also on both LEFT and RIGHT cable (RIGHT cable is 5V tolerant)
- updated UART: disabled the Rx errors to avoid DMA stop and additional need to manage the UART error handler
- added Button support LEFT/RIGHT
</commit_message>
<xml_diff>
--- a/docs/mainboard_pics.pptx
+++ b/docs/mainboard_pics.pptx
@@ -5,7 +5,7 @@
     <p:sldMasterId id="2147483672" r:id="rId1"/>
   </p:sldMasterIdLst>
   <p:sldIdLst>
-    <p:sldId id="257" r:id="rId2"/>
+    <p:sldId id="259" r:id="rId2"/>
   </p:sldIdLst>
   <p:sldSz cx="21442363" cy="15360650"/>
   <p:notesSz cx="6858000" cy="9144000"/>
@@ -243,7 +243,7 @@
           <a:p>
             <a:fld id="{32936937-EAA9-45F5-BFDC-3AB1C666CB91}" type="datetimeFigureOut">
               <a:rPr lang="en-US" smtClean="0"/>
-              <a:t>5/30/2020</a:t>
+              <a:t>6/25/2020</a:t>
             </a:fld>
             <a:endParaRPr lang="en-US"/>
           </a:p>
@@ -413,7 +413,7 @@
           <a:p>
             <a:fld id="{32936937-EAA9-45F5-BFDC-3AB1C666CB91}" type="datetimeFigureOut">
               <a:rPr lang="en-US" smtClean="0"/>
-              <a:t>5/30/2020</a:t>
+              <a:t>6/25/2020</a:t>
             </a:fld>
             <a:endParaRPr lang="en-US"/>
           </a:p>
@@ -593,7 +593,7 @@
           <a:p>
             <a:fld id="{32936937-EAA9-45F5-BFDC-3AB1C666CB91}" type="datetimeFigureOut">
               <a:rPr lang="en-US" smtClean="0"/>
-              <a:t>5/30/2020</a:t>
+              <a:t>6/25/2020</a:t>
             </a:fld>
             <a:endParaRPr lang="en-US"/>
           </a:p>
@@ -763,7 +763,7 @@
           <a:p>
             <a:fld id="{32936937-EAA9-45F5-BFDC-3AB1C666CB91}" type="datetimeFigureOut">
               <a:rPr lang="en-US" smtClean="0"/>
-              <a:t>5/30/2020</a:t>
+              <a:t>6/25/2020</a:t>
             </a:fld>
             <a:endParaRPr lang="en-US"/>
           </a:p>
@@ -1007,7 +1007,7 @@
           <a:p>
             <a:fld id="{32936937-EAA9-45F5-BFDC-3AB1C666CB91}" type="datetimeFigureOut">
               <a:rPr lang="en-US" smtClean="0"/>
-              <a:t>5/30/2020</a:t>
+              <a:t>6/25/2020</a:t>
             </a:fld>
             <a:endParaRPr lang="en-US"/>
           </a:p>
@@ -1239,7 +1239,7 @@
           <a:p>
             <a:fld id="{32936937-EAA9-45F5-BFDC-3AB1C666CB91}" type="datetimeFigureOut">
               <a:rPr lang="en-US" smtClean="0"/>
-              <a:t>5/30/2020</a:t>
+              <a:t>6/25/2020</a:t>
             </a:fld>
             <a:endParaRPr lang="en-US"/>
           </a:p>
@@ -1606,7 +1606,7 @@
           <a:p>
             <a:fld id="{32936937-EAA9-45F5-BFDC-3AB1C666CB91}" type="datetimeFigureOut">
               <a:rPr lang="en-US" smtClean="0"/>
-              <a:t>5/30/2020</a:t>
+              <a:t>6/25/2020</a:t>
             </a:fld>
             <a:endParaRPr lang="en-US"/>
           </a:p>
@@ -1724,7 +1724,7 @@
           <a:p>
             <a:fld id="{32936937-EAA9-45F5-BFDC-3AB1C666CB91}" type="datetimeFigureOut">
               <a:rPr lang="en-US" smtClean="0"/>
-              <a:t>5/30/2020</a:t>
+              <a:t>6/25/2020</a:t>
             </a:fld>
             <a:endParaRPr lang="en-US"/>
           </a:p>
@@ -1819,7 +1819,7 @@
           <a:p>
             <a:fld id="{32936937-EAA9-45F5-BFDC-3AB1C666CB91}" type="datetimeFigureOut">
               <a:rPr lang="en-US" smtClean="0"/>
-              <a:t>5/30/2020</a:t>
+              <a:t>6/25/2020</a:t>
             </a:fld>
             <a:endParaRPr lang="en-US"/>
           </a:p>
@@ -2096,7 +2096,7 @@
           <a:p>
             <a:fld id="{32936937-EAA9-45F5-BFDC-3AB1C666CB91}" type="datetimeFigureOut">
               <a:rPr lang="en-US" smtClean="0"/>
-              <a:t>5/30/2020</a:t>
+              <a:t>6/25/2020</a:t>
             </a:fld>
             <a:endParaRPr lang="en-US"/>
           </a:p>
@@ -2353,7 +2353,7 @@
           <a:p>
             <a:fld id="{32936937-EAA9-45F5-BFDC-3AB1C666CB91}" type="datetimeFigureOut">
               <a:rPr lang="en-US" smtClean="0"/>
-              <a:t>5/30/2020</a:t>
+              <a:t>6/25/2020</a:t>
             </a:fld>
             <a:endParaRPr lang="en-US"/>
           </a:p>
@@ -2566,7 +2566,7 @@
           <a:p>
             <a:fld id="{32936937-EAA9-45F5-BFDC-3AB1C666CB91}" type="datetimeFigureOut">
               <a:rPr lang="en-US" smtClean="0"/>
-              <a:t>5/30/2020</a:t>
+              <a:t>6/25/2020</a:t>
             </a:fld>
             <a:endParaRPr lang="en-US"/>
           </a:p>
@@ -2971,6 +2971,1384 @@
           <a:chExt cx="0" cy="0"/>
         </a:xfrm>
       </p:grpSpPr>
+      <p:sp>
+        <p:nvSpPr>
+          <p:cNvPr id="69" name="TextBox 68"/>
+          <p:cNvSpPr txBox="1"/>
+          <p:nvPr/>
+        </p:nvSpPr>
+        <p:spPr>
+          <a:xfrm>
+            <a:off x="17319096" y="11396166"/>
+            <a:ext cx="287189" cy="400288"/>
+          </a:xfrm>
+          <a:custGeom>
+            <a:avLst/>
+            <a:gdLst>
+              <a:gd name="connsiteX0" fmla="*/ 0 w 2137418"/>
+              <a:gd name="connsiteY0" fmla="*/ 0 h 369332"/>
+              <a:gd name="connsiteX1" fmla="*/ 2137418 w 2137418"/>
+              <a:gd name="connsiteY1" fmla="*/ 0 h 369332"/>
+              <a:gd name="connsiteX2" fmla="*/ 2137418 w 2137418"/>
+              <a:gd name="connsiteY2" fmla="*/ 369332 h 369332"/>
+              <a:gd name="connsiteX3" fmla="*/ 0 w 2137418"/>
+              <a:gd name="connsiteY3" fmla="*/ 369332 h 369332"/>
+              <a:gd name="connsiteX4" fmla="*/ 0 w 2137418"/>
+              <a:gd name="connsiteY4" fmla="*/ 0 h 369332"/>
+              <a:gd name="connsiteX0" fmla="*/ 0 w 2137418"/>
+              <a:gd name="connsiteY0" fmla="*/ 0 h 431244"/>
+              <a:gd name="connsiteX1" fmla="*/ 2137418 w 2137418"/>
+              <a:gd name="connsiteY1" fmla="*/ 0 h 431244"/>
+              <a:gd name="connsiteX2" fmla="*/ 299093 w 2137418"/>
+              <a:gd name="connsiteY2" fmla="*/ 431244 h 431244"/>
+              <a:gd name="connsiteX3" fmla="*/ 0 w 2137418"/>
+              <a:gd name="connsiteY3" fmla="*/ 369332 h 431244"/>
+              <a:gd name="connsiteX4" fmla="*/ 0 w 2137418"/>
+              <a:gd name="connsiteY4" fmla="*/ 0 h 431244"/>
+              <a:gd name="connsiteX0" fmla="*/ 0 w 313380"/>
+              <a:gd name="connsiteY0" fmla="*/ 0 h 431244"/>
+              <a:gd name="connsiteX1" fmla="*/ 313380 w 313380"/>
+              <a:gd name="connsiteY1" fmla="*/ 85725 h 431244"/>
+              <a:gd name="connsiteX2" fmla="*/ 299093 w 313380"/>
+              <a:gd name="connsiteY2" fmla="*/ 431244 h 431244"/>
+              <a:gd name="connsiteX3" fmla="*/ 0 w 313380"/>
+              <a:gd name="connsiteY3" fmla="*/ 369332 h 431244"/>
+              <a:gd name="connsiteX4" fmla="*/ 0 w 313380"/>
+              <a:gd name="connsiteY4" fmla="*/ 0 h 431244"/>
+              <a:gd name="connsiteX0" fmla="*/ 0 w 299093"/>
+              <a:gd name="connsiteY0" fmla="*/ 0 h 431244"/>
+              <a:gd name="connsiteX1" fmla="*/ 294330 w 299093"/>
+              <a:gd name="connsiteY1" fmla="*/ 119062 h 431244"/>
+              <a:gd name="connsiteX2" fmla="*/ 299093 w 299093"/>
+              <a:gd name="connsiteY2" fmla="*/ 431244 h 431244"/>
+              <a:gd name="connsiteX3" fmla="*/ 0 w 299093"/>
+              <a:gd name="connsiteY3" fmla="*/ 369332 h 431244"/>
+              <a:gd name="connsiteX4" fmla="*/ 0 w 299093"/>
+              <a:gd name="connsiteY4" fmla="*/ 0 h 431244"/>
+              <a:gd name="connsiteX0" fmla="*/ 0 w 318223"/>
+              <a:gd name="connsiteY0" fmla="*/ 0 h 431244"/>
+              <a:gd name="connsiteX1" fmla="*/ 318142 w 318223"/>
+              <a:gd name="connsiteY1" fmla="*/ 123825 h 431244"/>
+              <a:gd name="connsiteX2" fmla="*/ 299093 w 318223"/>
+              <a:gd name="connsiteY2" fmla="*/ 431244 h 431244"/>
+              <a:gd name="connsiteX3" fmla="*/ 0 w 318223"/>
+              <a:gd name="connsiteY3" fmla="*/ 369332 h 431244"/>
+              <a:gd name="connsiteX4" fmla="*/ 0 w 318223"/>
+              <a:gd name="connsiteY4" fmla="*/ 0 h 431244"/>
+              <a:gd name="connsiteX0" fmla="*/ 0 w 346718"/>
+              <a:gd name="connsiteY0" fmla="*/ 0 h 431244"/>
+              <a:gd name="connsiteX1" fmla="*/ 318142 w 346718"/>
+              <a:gd name="connsiteY1" fmla="*/ 123825 h 431244"/>
+              <a:gd name="connsiteX2" fmla="*/ 346718 w 346718"/>
+              <a:gd name="connsiteY2" fmla="*/ 431244 h 431244"/>
+              <a:gd name="connsiteX3" fmla="*/ 0 w 346718"/>
+              <a:gd name="connsiteY3" fmla="*/ 369332 h 431244"/>
+              <a:gd name="connsiteX4" fmla="*/ 0 w 346718"/>
+              <a:gd name="connsiteY4" fmla="*/ 0 h 431244"/>
+              <a:gd name="connsiteX0" fmla="*/ 0 w 346718"/>
+              <a:gd name="connsiteY0" fmla="*/ 0 h 431244"/>
+              <a:gd name="connsiteX1" fmla="*/ 318142 w 346718"/>
+              <a:gd name="connsiteY1" fmla="*/ 123825 h 431244"/>
+              <a:gd name="connsiteX2" fmla="*/ 346718 w 346718"/>
+              <a:gd name="connsiteY2" fmla="*/ 431244 h 431244"/>
+              <a:gd name="connsiteX3" fmla="*/ 19050 w 346718"/>
+              <a:gd name="connsiteY3" fmla="*/ 359807 h 431244"/>
+              <a:gd name="connsiteX4" fmla="*/ 0 w 346718"/>
+              <a:gd name="connsiteY4" fmla="*/ 0 h 431244"/>
+              <a:gd name="connsiteX0" fmla="*/ 42862 w 327668"/>
+              <a:gd name="connsiteY0" fmla="*/ 0 h 416956"/>
+              <a:gd name="connsiteX1" fmla="*/ 299092 w 327668"/>
+              <a:gd name="connsiteY1" fmla="*/ 109537 h 416956"/>
+              <a:gd name="connsiteX2" fmla="*/ 327668 w 327668"/>
+              <a:gd name="connsiteY2" fmla="*/ 416956 h 416956"/>
+              <a:gd name="connsiteX3" fmla="*/ 0 w 327668"/>
+              <a:gd name="connsiteY3" fmla="*/ 345519 h 416956"/>
+              <a:gd name="connsiteX4" fmla="*/ 42862 w 327668"/>
+              <a:gd name="connsiteY4" fmla="*/ 0 h 416956"/>
+              <a:gd name="connsiteX0" fmla="*/ 0 w 332431"/>
+              <a:gd name="connsiteY0" fmla="*/ 0 h 445531"/>
+              <a:gd name="connsiteX1" fmla="*/ 303855 w 332431"/>
+              <a:gd name="connsiteY1" fmla="*/ 138112 h 445531"/>
+              <a:gd name="connsiteX2" fmla="*/ 332431 w 332431"/>
+              <a:gd name="connsiteY2" fmla="*/ 445531 h 445531"/>
+              <a:gd name="connsiteX3" fmla="*/ 4763 w 332431"/>
+              <a:gd name="connsiteY3" fmla="*/ 374094 h 445531"/>
+              <a:gd name="connsiteX4" fmla="*/ 0 w 332431"/>
+              <a:gd name="connsiteY4" fmla="*/ 0 h 445531"/>
+              <a:gd name="connsiteX0" fmla="*/ 0 w 320525"/>
+              <a:gd name="connsiteY0" fmla="*/ 0 h 445531"/>
+              <a:gd name="connsiteX1" fmla="*/ 303855 w 320525"/>
+              <a:gd name="connsiteY1" fmla="*/ 138112 h 445531"/>
+              <a:gd name="connsiteX2" fmla="*/ 320525 w 320525"/>
+              <a:gd name="connsiteY2" fmla="*/ 445531 h 445531"/>
+              <a:gd name="connsiteX3" fmla="*/ 4763 w 320525"/>
+              <a:gd name="connsiteY3" fmla="*/ 374094 h 445531"/>
+              <a:gd name="connsiteX4" fmla="*/ 0 w 320525"/>
+              <a:gd name="connsiteY4" fmla="*/ 0 h 445531"/>
+              <a:gd name="connsiteX0" fmla="*/ 0 w 320981"/>
+              <a:gd name="connsiteY0" fmla="*/ 0 h 445531"/>
+              <a:gd name="connsiteX1" fmla="*/ 320523 w 320981"/>
+              <a:gd name="connsiteY1" fmla="*/ 176212 h 445531"/>
+              <a:gd name="connsiteX2" fmla="*/ 320525 w 320981"/>
+              <a:gd name="connsiteY2" fmla="*/ 445531 h 445531"/>
+              <a:gd name="connsiteX3" fmla="*/ 4763 w 320981"/>
+              <a:gd name="connsiteY3" fmla="*/ 374094 h 445531"/>
+              <a:gd name="connsiteX4" fmla="*/ 0 w 320981"/>
+              <a:gd name="connsiteY4" fmla="*/ 0 h 445531"/>
+              <a:gd name="connsiteX0" fmla="*/ 0 w 325497"/>
+              <a:gd name="connsiteY0" fmla="*/ 0 h 445531"/>
+              <a:gd name="connsiteX1" fmla="*/ 325286 w 325497"/>
+              <a:gd name="connsiteY1" fmla="*/ 159543 h 445531"/>
+              <a:gd name="connsiteX2" fmla="*/ 320525 w 325497"/>
+              <a:gd name="connsiteY2" fmla="*/ 445531 h 445531"/>
+              <a:gd name="connsiteX3" fmla="*/ 4763 w 325497"/>
+              <a:gd name="connsiteY3" fmla="*/ 374094 h 445531"/>
+              <a:gd name="connsiteX4" fmla="*/ 0 w 325497"/>
+              <a:gd name="connsiteY4" fmla="*/ 0 h 445531"/>
+              <a:gd name="connsiteX0" fmla="*/ 0 w 325497"/>
+              <a:gd name="connsiteY0" fmla="*/ 0 h 445531"/>
+              <a:gd name="connsiteX1" fmla="*/ 325286 w 325497"/>
+              <a:gd name="connsiteY1" fmla="*/ 157161 h 445531"/>
+              <a:gd name="connsiteX2" fmla="*/ 320525 w 325497"/>
+              <a:gd name="connsiteY2" fmla="*/ 445531 h 445531"/>
+              <a:gd name="connsiteX3" fmla="*/ 4763 w 325497"/>
+              <a:gd name="connsiteY3" fmla="*/ 374094 h 445531"/>
+              <a:gd name="connsiteX4" fmla="*/ 0 w 325497"/>
+              <a:gd name="connsiteY4" fmla="*/ 0 h 445531"/>
+              <a:gd name="connsiteX0" fmla="*/ 0 w 325497"/>
+              <a:gd name="connsiteY0" fmla="*/ 0 h 450293"/>
+              <a:gd name="connsiteX1" fmla="*/ 325286 w 325497"/>
+              <a:gd name="connsiteY1" fmla="*/ 157161 h 450293"/>
+              <a:gd name="connsiteX2" fmla="*/ 320525 w 325497"/>
+              <a:gd name="connsiteY2" fmla="*/ 450293 h 450293"/>
+              <a:gd name="connsiteX3" fmla="*/ 4763 w 325497"/>
+              <a:gd name="connsiteY3" fmla="*/ 374094 h 450293"/>
+              <a:gd name="connsiteX4" fmla="*/ 0 w 325497"/>
+              <a:gd name="connsiteY4" fmla="*/ 0 h 450293"/>
+              <a:gd name="connsiteX0" fmla="*/ 0 w 325497"/>
+              <a:gd name="connsiteY0" fmla="*/ 0 h 452675"/>
+              <a:gd name="connsiteX1" fmla="*/ 325286 w 325497"/>
+              <a:gd name="connsiteY1" fmla="*/ 159543 h 452675"/>
+              <a:gd name="connsiteX2" fmla="*/ 320525 w 325497"/>
+              <a:gd name="connsiteY2" fmla="*/ 452675 h 452675"/>
+              <a:gd name="connsiteX3" fmla="*/ 4763 w 325497"/>
+              <a:gd name="connsiteY3" fmla="*/ 376476 h 452675"/>
+              <a:gd name="connsiteX4" fmla="*/ 0 w 325497"/>
+              <a:gd name="connsiteY4" fmla="*/ 0 h 452675"/>
+              <a:gd name="connsiteX0" fmla="*/ 0 w 320525"/>
+              <a:gd name="connsiteY0" fmla="*/ 0 h 452675"/>
+              <a:gd name="connsiteX1" fmla="*/ 280043 w 320525"/>
+              <a:gd name="connsiteY1" fmla="*/ 80962 h 452675"/>
+              <a:gd name="connsiteX2" fmla="*/ 320525 w 320525"/>
+              <a:gd name="connsiteY2" fmla="*/ 452675 h 452675"/>
+              <a:gd name="connsiteX3" fmla="*/ 4763 w 320525"/>
+              <a:gd name="connsiteY3" fmla="*/ 376476 h 452675"/>
+              <a:gd name="connsiteX4" fmla="*/ 0 w 320525"/>
+              <a:gd name="connsiteY4" fmla="*/ 0 h 452675"/>
+              <a:gd name="connsiteX0" fmla="*/ 0 w 280133"/>
+              <a:gd name="connsiteY0" fmla="*/ 0 h 376476"/>
+              <a:gd name="connsiteX1" fmla="*/ 280043 w 280133"/>
+              <a:gd name="connsiteY1" fmla="*/ 80962 h 376476"/>
+              <a:gd name="connsiteX2" fmla="*/ 263375 w 280133"/>
+              <a:gd name="connsiteY2" fmla="*/ 359806 h 376476"/>
+              <a:gd name="connsiteX3" fmla="*/ 4763 w 280133"/>
+              <a:gd name="connsiteY3" fmla="*/ 376476 h 376476"/>
+              <a:gd name="connsiteX4" fmla="*/ 0 w 280133"/>
+              <a:gd name="connsiteY4" fmla="*/ 0 h 376476"/>
+              <a:gd name="connsiteX0" fmla="*/ 0 w 280145"/>
+              <a:gd name="connsiteY0" fmla="*/ 0 h 376476"/>
+              <a:gd name="connsiteX1" fmla="*/ 280043 w 280145"/>
+              <a:gd name="connsiteY1" fmla="*/ 80962 h 376476"/>
+              <a:gd name="connsiteX2" fmla="*/ 265757 w 280145"/>
+              <a:gd name="connsiteY2" fmla="*/ 374093 h 376476"/>
+              <a:gd name="connsiteX3" fmla="*/ 4763 w 280145"/>
+              <a:gd name="connsiteY3" fmla="*/ 376476 h 376476"/>
+              <a:gd name="connsiteX4" fmla="*/ 0 w 280145"/>
+              <a:gd name="connsiteY4" fmla="*/ 0 h 376476"/>
+              <a:gd name="connsiteX0" fmla="*/ 0 w 280145"/>
+              <a:gd name="connsiteY0" fmla="*/ 0 h 376476"/>
+              <a:gd name="connsiteX1" fmla="*/ 280043 w 280145"/>
+              <a:gd name="connsiteY1" fmla="*/ 80962 h 376476"/>
+              <a:gd name="connsiteX2" fmla="*/ 265757 w 280145"/>
+              <a:gd name="connsiteY2" fmla="*/ 374093 h 376476"/>
+              <a:gd name="connsiteX3" fmla="*/ 21432 w 280145"/>
+              <a:gd name="connsiteY3" fmla="*/ 376476 h 376476"/>
+              <a:gd name="connsiteX4" fmla="*/ 0 w 280145"/>
+              <a:gd name="connsiteY4" fmla="*/ 0 h 376476"/>
+              <a:gd name="connsiteX0" fmla="*/ 0 w 327770"/>
+              <a:gd name="connsiteY0" fmla="*/ 0 h 371713"/>
+              <a:gd name="connsiteX1" fmla="*/ 327668 w 327770"/>
+              <a:gd name="connsiteY1" fmla="*/ 76199 h 371713"/>
+              <a:gd name="connsiteX2" fmla="*/ 313382 w 327770"/>
+              <a:gd name="connsiteY2" fmla="*/ 369330 h 371713"/>
+              <a:gd name="connsiteX3" fmla="*/ 69057 w 327770"/>
+              <a:gd name="connsiteY3" fmla="*/ 371713 h 371713"/>
+              <a:gd name="connsiteX4" fmla="*/ 0 w 327770"/>
+              <a:gd name="connsiteY4" fmla="*/ 0 h 371713"/>
+              <a:gd name="connsiteX0" fmla="*/ 0 w 296813"/>
+              <a:gd name="connsiteY0" fmla="*/ 0 h 366950"/>
+              <a:gd name="connsiteX1" fmla="*/ 296711 w 296813"/>
+              <a:gd name="connsiteY1" fmla="*/ 71436 h 366950"/>
+              <a:gd name="connsiteX2" fmla="*/ 282425 w 296813"/>
+              <a:gd name="connsiteY2" fmla="*/ 364567 h 366950"/>
+              <a:gd name="connsiteX3" fmla="*/ 38100 w 296813"/>
+              <a:gd name="connsiteY3" fmla="*/ 366950 h 366950"/>
+              <a:gd name="connsiteX4" fmla="*/ 0 w 296813"/>
+              <a:gd name="connsiteY4" fmla="*/ 0 h 366950"/>
+              <a:gd name="connsiteX0" fmla="*/ 0 w 294446"/>
+              <a:gd name="connsiteY0" fmla="*/ 0 h 366950"/>
+              <a:gd name="connsiteX1" fmla="*/ 294329 w 294446"/>
+              <a:gd name="connsiteY1" fmla="*/ 64292 h 366950"/>
+              <a:gd name="connsiteX2" fmla="*/ 282425 w 294446"/>
+              <a:gd name="connsiteY2" fmla="*/ 364567 h 366950"/>
+              <a:gd name="connsiteX3" fmla="*/ 38100 w 294446"/>
+              <a:gd name="connsiteY3" fmla="*/ 366950 h 366950"/>
+              <a:gd name="connsiteX4" fmla="*/ 0 w 294446"/>
+              <a:gd name="connsiteY4" fmla="*/ 0 h 366950"/>
+              <a:gd name="connsiteX0" fmla="*/ 0 w 296828"/>
+              <a:gd name="connsiteY0" fmla="*/ 0 h 381237"/>
+              <a:gd name="connsiteX1" fmla="*/ 296711 w 296828"/>
+              <a:gd name="connsiteY1" fmla="*/ 78579 h 381237"/>
+              <a:gd name="connsiteX2" fmla="*/ 284807 w 296828"/>
+              <a:gd name="connsiteY2" fmla="*/ 378854 h 381237"/>
+              <a:gd name="connsiteX3" fmla="*/ 40482 w 296828"/>
+              <a:gd name="connsiteY3" fmla="*/ 381237 h 381237"/>
+              <a:gd name="connsiteX4" fmla="*/ 0 w 296828"/>
+              <a:gd name="connsiteY4" fmla="*/ 0 h 381237"/>
+              <a:gd name="connsiteX0" fmla="*/ 0 w 296828"/>
+              <a:gd name="connsiteY0" fmla="*/ 0 h 383618"/>
+              <a:gd name="connsiteX1" fmla="*/ 296711 w 296828"/>
+              <a:gd name="connsiteY1" fmla="*/ 78579 h 383618"/>
+              <a:gd name="connsiteX2" fmla="*/ 284807 w 296828"/>
+              <a:gd name="connsiteY2" fmla="*/ 378854 h 383618"/>
+              <a:gd name="connsiteX3" fmla="*/ 33339 w 296828"/>
+              <a:gd name="connsiteY3" fmla="*/ 383618 h 383618"/>
+              <a:gd name="connsiteX4" fmla="*/ 0 w 296828"/>
+              <a:gd name="connsiteY4" fmla="*/ 0 h 383618"/>
+              <a:gd name="connsiteX0" fmla="*/ 0 w 296828"/>
+              <a:gd name="connsiteY0" fmla="*/ 0 h 383618"/>
+              <a:gd name="connsiteX1" fmla="*/ 296711 w 296828"/>
+              <a:gd name="connsiteY1" fmla="*/ 66673 h 383618"/>
+              <a:gd name="connsiteX2" fmla="*/ 284807 w 296828"/>
+              <a:gd name="connsiteY2" fmla="*/ 378854 h 383618"/>
+              <a:gd name="connsiteX3" fmla="*/ 33339 w 296828"/>
+              <a:gd name="connsiteY3" fmla="*/ 383618 h 383618"/>
+              <a:gd name="connsiteX4" fmla="*/ 0 w 296828"/>
+              <a:gd name="connsiteY4" fmla="*/ 0 h 383618"/>
+              <a:gd name="connsiteX0" fmla="*/ 0 w 296828"/>
+              <a:gd name="connsiteY0" fmla="*/ 0 h 393143"/>
+              <a:gd name="connsiteX1" fmla="*/ 296711 w 296828"/>
+              <a:gd name="connsiteY1" fmla="*/ 76198 h 393143"/>
+              <a:gd name="connsiteX2" fmla="*/ 284807 w 296828"/>
+              <a:gd name="connsiteY2" fmla="*/ 388379 h 393143"/>
+              <a:gd name="connsiteX3" fmla="*/ 33339 w 296828"/>
+              <a:gd name="connsiteY3" fmla="*/ 393143 h 393143"/>
+              <a:gd name="connsiteX4" fmla="*/ 0 w 296828"/>
+              <a:gd name="connsiteY4" fmla="*/ 0 h 393143"/>
+              <a:gd name="connsiteX0" fmla="*/ 0 w 296828"/>
+              <a:gd name="connsiteY0" fmla="*/ 83345 h 476488"/>
+              <a:gd name="connsiteX1" fmla="*/ 296711 w 296828"/>
+              <a:gd name="connsiteY1" fmla="*/ 0 h 476488"/>
+              <a:gd name="connsiteX2" fmla="*/ 284807 w 296828"/>
+              <a:gd name="connsiteY2" fmla="*/ 471724 h 476488"/>
+              <a:gd name="connsiteX3" fmla="*/ 33339 w 296828"/>
+              <a:gd name="connsiteY3" fmla="*/ 476488 h 476488"/>
+              <a:gd name="connsiteX4" fmla="*/ 0 w 296828"/>
+              <a:gd name="connsiteY4" fmla="*/ 83345 h 476488"/>
+              <a:gd name="connsiteX0" fmla="*/ 0 w 297169"/>
+              <a:gd name="connsiteY0" fmla="*/ 83345 h 476488"/>
+              <a:gd name="connsiteX1" fmla="*/ 296711 w 297169"/>
+              <a:gd name="connsiteY1" fmla="*/ 0 h 476488"/>
+              <a:gd name="connsiteX2" fmla="*/ 296713 w 297169"/>
+              <a:gd name="connsiteY2" fmla="*/ 369331 h 476488"/>
+              <a:gd name="connsiteX3" fmla="*/ 33339 w 297169"/>
+              <a:gd name="connsiteY3" fmla="*/ 476488 h 476488"/>
+              <a:gd name="connsiteX4" fmla="*/ 0 w 297169"/>
+              <a:gd name="connsiteY4" fmla="*/ 83345 h 476488"/>
+              <a:gd name="connsiteX0" fmla="*/ 0 w 299095"/>
+              <a:gd name="connsiteY0" fmla="*/ 83345 h 476488"/>
+              <a:gd name="connsiteX1" fmla="*/ 296711 w 299095"/>
+              <a:gd name="connsiteY1" fmla="*/ 0 h 476488"/>
+              <a:gd name="connsiteX2" fmla="*/ 299095 w 299095"/>
+              <a:gd name="connsiteY2" fmla="*/ 381237 h 476488"/>
+              <a:gd name="connsiteX3" fmla="*/ 33339 w 299095"/>
+              <a:gd name="connsiteY3" fmla="*/ 476488 h 476488"/>
+              <a:gd name="connsiteX4" fmla="*/ 0 w 299095"/>
+              <a:gd name="connsiteY4" fmla="*/ 83345 h 476488"/>
+              <a:gd name="connsiteX0" fmla="*/ 0 w 287189"/>
+              <a:gd name="connsiteY0" fmla="*/ 50008 h 476488"/>
+              <a:gd name="connsiteX1" fmla="*/ 284805 w 287189"/>
+              <a:gd name="connsiteY1" fmla="*/ 0 h 476488"/>
+              <a:gd name="connsiteX2" fmla="*/ 287189 w 287189"/>
+              <a:gd name="connsiteY2" fmla="*/ 381237 h 476488"/>
+              <a:gd name="connsiteX3" fmla="*/ 21433 w 287189"/>
+              <a:gd name="connsiteY3" fmla="*/ 476488 h 476488"/>
+              <a:gd name="connsiteX4" fmla="*/ 0 w 287189"/>
+              <a:gd name="connsiteY4" fmla="*/ 50008 h 476488"/>
+              <a:gd name="connsiteX0" fmla="*/ 0 w 287189"/>
+              <a:gd name="connsiteY0" fmla="*/ 50008 h 400288"/>
+              <a:gd name="connsiteX1" fmla="*/ 284805 w 287189"/>
+              <a:gd name="connsiteY1" fmla="*/ 0 h 400288"/>
+              <a:gd name="connsiteX2" fmla="*/ 287189 w 287189"/>
+              <a:gd name="connsiteY2" fmla="*/ 381237 h 400288"/>
+              <a:gd name="connsiteX3" fmla="*/ 4764 w 287189"/>
+              <a:gd name="connsiteY3" fmla="*/ 400288 h 400288"/>
+              <a:gd name="connsiteX4" fmla="*/ 0 w 287189"/>
+              <a:gd name="connsiteY4" fmla="*/ 50008 h 400288"/>
+              <a:gd name="connsiteX0" fmla="*/ 0 w 287189"/>
+              <a:gd name="connsiteY0" fmla="*/ 50008 h 402670"/>
+              <a:gd name="connsiteX1" fmla="*/ 284805 w 287189"/>
+              <a:gd name="connsiteY1" fmla="*/ 0 h 402670"/>
+              <a:gd name="connsiteX2" fmla="*/ 287189 w 287189"/>
+              <a:gd name="connsiteY2" fmla="*/ 381237 h 402670"/>
+              <a:gd name="connsiteX3" fmla="*/ 28576 w 287189"/>
+              <a:gd name="connsiteY3" fmla="*/ 402670 h 402670"/>
+              <a:gd name="connsiteX4" fmla="*/ 0 w 287189"/>
+              <a:gd name="connsiteY4" fmla="*/ 50008 h 402670"/>
+              <a:gd name="connsiteX0" fmla="*/ 0 w 287189"/>
+              <a:gd name="connsiteY0" fmla="*/ 50008 h 400288"/>
+              <a:gd name="connsiteX1" fmla="*/ 284805 w 287189"/>
+              <a:gd name="connsiteY1" fmla="*/ 0 h 400288"/>
+              <a:gd name="connsiteX2" fmla="*/ 287189 w 287189"/>
+              <a:gd name="connsiteY2" fmla="*/ 381237 h 400288"/>
+              <a:gd name="connsiteX3" fmla="*/ 19051 w 287189"/>
+              <a:gd name="connsiteY3" fmla="*/ 400288 h 400288"/>
+              <a:gd name="connsiteX4" fmla="*/ 0 w 287189"/>
+              <a:gd name="connsiteY4" fmla="*/ 50008 h 400288"/>
+              <a:gd name="connsiteX0" fmla="*/ 0 w 287189"/>
+              <a:gd name="connsiteY0" fmla="*/ 50008 h 400288"/>
+              <a:gd name="connsiteX1" fmla="*/ 284805 w 287189"/>
+              <a:gd name="connsiteY1" fmla="*/ 0 h 400288"/>
+              <a:gd name="connsiteX2" fmla="*/ 287189 w 287189"/>
+              <a:gd name="connsiteY2" fmla="*/ 393143 h 400288"/>
+              <a:gd name="connsiteX3" fmla="*/ 19051 w 287189"/>
+              <a:gd name="connsiteY3" fmla="*/ 400288 h 400288"/>
+              <a:gd name="connsiteX4" fmla="*/ 0 w 287189"/>
+              <a:gd name="connsiteY4" fmla="*/ 50008 h 400288"/>
+            </a:gdLst>
+            <a:ahLst/>
+            <a:cxnLst>
+              <a:cxn ang="0">
+                <a:pos x="connsiteX0" y="connsiteY0"/>
+              </a:cxn>
+              <a:cxn ang="0">
+                <a:pos x="connsiteX1" y="connsiteY1"/>
+              </a:cxn>
+              <a:cxn ang="0">
+                <a:pos x="connsiteX2" y="connsiteY2"/>
+              </a:cxn>
+              <a:cxn ang="0">
+                <a:pos x="connsiteX3" y="connsiteY3"/>
+              </a:cxn>
+              <a:cxn ang="0">
+                <a:pos x="connsiteX4" y="connsiteY4"/>
+              </a:cxn>
+            </a:cxnLst>
+            <a:rect l="l" t="t" r="r" b="b"/>
+            <a:pathLst>
+              <a:path w="287189" h="400288">
+                <a:moveTo>
+                  <a:pt x="0" y="50008"/>
+                </a:moveTo>
+                <a:lnTo>
+                  <a:pt x="284805" y="0"/>
+                </a:lnTo>
+                <a:cubicBezTo>
+                  <a:pt x="286393" y="104061"/>
+                  <a:pt x="285601" y="289082"/>
+                  <a:pt x="287189" y="393143"/>
+                </a:cubicBezTo>
+                <a:lnTo>
+                  <a:pt x="19051" y="400288"/>
+                </a:lnTo>
+                <a:cubicBezTo>
+                  <a:pt x="17463" y="275590"/>
+                  <a:pt x="1588" y="174706"/>
+                  <a:pt x="0" y="50008"/>
+                </a:cubicBezTo>
+                <a:close/>
+              </a:path>
+            </a:pathLst>
+          </a:custGeom>
+          <a:solidFill>
+            <a:srgbClr val="29A329"/>
+          </a:solidFill>
+        </p:spPr>
+        <p:txBody>
+          <a:bodyPr wrap="square" lIns="0" tIns="0" rIns="0" bIns="0" rtlCol="0">
+            <a:spAutoFit/>
+          </a:bodyPr>
+          <a:lstStyle/>
+          <a:p>
+            <a:endParaRPr lang="en-US" sz="2400" dirty="0">
+              <a:solidFill>
+                <a:schemeClr val="bg1"/>
+              </a:solidFill>
+            </a:endParaRPr>
+          </a:p>
+        </p:txBody>
+      </p:sp>
+      <p:sp>
+        <p:nvSpPr>
+          <p:cNvPr id="71" name="TextBox 70"/>
+          <p:cNvSpPr txBox="1"/>
+          <p:nvPr/>
+        </p:nvSpPr>
+        <p:spPr>
+          <a:xfrm>
+            <a:off x="17269412" y="11033806"/>
+            <a:ext cx="387658" cy="474108"/>
+          </a:xfrm>
+          <a:custGeom>
+            <a:avLst/>
+            <a:gdLst>
+              <a:gd name="connsiteX0" fmla="*/ 0 w 2137418"/>
+              <a:gd name="connsiteY0" fmla="*/ 0 h 369332"/>
+              <a:gd name="connsiteX1" fmla="*/ 2137418 w 2137418"/>
+              <a:gd name="connsiteY1" fmla="*/ 0 h 369332"/>
+              <a:gd name="connsiteX2" fmla="*/ 2137418 w 2137418"/>
+              <a:gd name="connsiteY2" fmla="*/ 369332 h 369332"/>
+              <a:gd name="connsiteX3" fmla="*/ 0 w 2137418"/>
+              <a:gd name="connsiteY3" fmla="*/ 369332 h 369332"/>
+              <a:gd name="connsiteX4" fmla="*/ 0 w 2137418"/>
+              <a:gd name="connsiteY4" fmla="*/ 0 h 369332"/>
+              <a:gd name="connsiteX0" fmla="*/ 0 w 2137418"/>
+              <a:gd name="connsiteY0" fmla="*/ 0 h 431244"/>
+              <a:gd name="connsiteX1" fmla="*/ 2137418 w 2137418"/>
+              <a:gd name="connsiteY1" fmla="*/ 0 h 431244"/>
+              <a:gd name="connsiteX2" fmla="*/ 299093 w 2137418"/>
+              <a:gd name="connsiteY2" fmla="*/ 431244 h 431244"/>
+              <a:gd name="connsiteX3" fmla="*/ 0 w 2137418"/>
+              <a:gd name="connsiteY3" fmla="*/ 369332 h 431244"/>
+              <a:gd name="connsiteX4" fmla="*/ 0 w 2137418"/>
+              <a:gd name="connsiteY4" fmla="*/ 0 h 431244"/>
+              <a:gd name="connsiteX0" fmla="*/ 0 w 313380"/>
+              <a:gd name="connsiteY0" fmla="*/ 0 h 431244"/>
+              <a:gd name="connsiteX1" fmla="*/ 313380 w 313380"/>
+              <a:gd name="connsiteY1" fmla="*/ 85725 h 431244"/>
+              <a:gd name="connsiteX2" fmla="*/ 299093 w 313380"/>
+              <a:gd name="connsiteY2" fmla="*/ 431244 h 431244"/>
+              <a:gd name="connsiteX3" fmla="*/ 0 w 313380"/>
+              <a:gd name="connsiteY3" fmla="*/ 369332 h 431244"/>
+              <a:gd name="connsiteX4" fmla="*/ 0 w 313380"/>
+              <a:gd name="connsiteY4" fmla="*/ 0 h 431244"/>
+              <a:gd name="connsiteX0" fmla="*/ 0 w 299093"/>
+              <a:gd name="connsiteY0" fmla="*/ 0 h 431244"/>
+              <a:gd name="connsiteX1" fmla="*/ 294330 w 299093"/>
+              <a:gd name="connsiteY1" fmla="*/ 119062 h 431244"/>
+              <a:gd name="connsiteX2" fmla="*/ 299093 w 299093"/>
+              <a:gd name="connsiteY2" fmla="*/ 431244 h 431244"/>
+              <a:gd name="connsiteX3" fmla="*/ 0 w 299093"/>
+              <a:gd name="connsiteY3" fmla="*/ 369332 h 431244"/>
+              <a:gd name="connsiteX4" fmla="*/ 0 w 299093"/>
+              <a:gd name="connsiteY4" fmla="*/ 0 h 431244"/>
+              <a:gd name="connsiteX0" fmla="*/ 0 w 318223"/>
+              <a:gd name="connsiteY0" fmla="*/ 0 h 431244"/>
+              <a:gd name="connsiteX1" fmla="*/ 318142 w 318223"/>
+              <a:gd name="connsiteY1" fmla="*/ 123825 h 431244"/>
+              <a:gd name="connsiteX2" fmla="*/ 299093 w 318223"/>
+              <a:gd name="connsiteY2" fmla="*/ 431244 h 431244"/>
+              <a:gd name="connsiteX3" fmla="*/ 0 w 318223"/>
+              <a:gd name="connsiteY3" fmla="*/ 369332 h 431244"/>
+              <a:gd name="connsiteX4" fmla="*/ 0 w 318223"/>
+              <a:gd name="connsiteY4" fmla="*/ 0 h 431244"/>
+              <a:gd name="connsiteX0" fmla="*/ 0 w 346718"/>
+              <a:gd name="connsiteY0" fmla="*/ 0 h 431244"/>
+              <a:gd name="connsiteX1" fmla="*/ 318142 w 346718"/>
+              <a:gd name="connsiteY1" fmla="*/ 123825 h 431244"/>
+              <a:gd name="connsiteX2" fmla="*/ 346718 w 346718"/>
+              <a:gd name="connsiteY2" fmla="*/ 431244 h 431244"/>
+              <a:gd name="connsiteX3" fmla="*/ 0 w 346718"/>
+              <a:gd name="connsiteY3" fmla="*/ 369332 h 431244"/>
+              <a:gd name="connsiteX4" fmla="*/ 0 w 346718"/>
+              <a:gd name="connsiteY4" fmla="*/ 0 h 431244"/>
+              <a:gd name="connsiteX0" fmla="*/ 0 w 346718"/>
+              <a:gd name="connsiteY0" fmla="*/ 0 h 431244"/>
+              <a:gd name="connsiteX1" fmla="*/ 318142 w 346718"/>
+              <a:gd name="connsiteY1" fmla="*/ 123825 h 431244"/>
+              <a:gd name="connsiteX2" fmla="*/ 346718 w 346718"/>
+              <a:gd name="connsiteY2" fmla="*/ 431244 h 431244"/>
+              <a:gd name="connsiteX3" fmla="*/ 19050 w 346718"/>
+              <a:gd name="connsiteY3" fmla="*/ 359807 h 431244"/>
+              <a:gd name="connsiteX4" fmla="*/ 0 w 346718"/>
+              <a:gd name="connsiteY4" fmla="*/ 0 h 431244"/>
+              <a:gd name="connsiteX0" fmla="*/ 42862 w 327668"/>
+              <a:gd name="connsiteY0" fmla="*/ 0 h 416956"/>
+              <a:gd name="connsiteX1" fmla="*/ 299092 w 327668"/>
+              <a:gd name="connsiteY1" fmla="*/ 109537 h 416956"/>
+              <a:gd name="connsiteX2" fmla="*/ 327668 w 327668"/>
+              <a:gd name="connsiteY2" fmla="*/ 416956 h 416956"/>
+              <a:gd name="connsiteX3" fmla="*/ 0 w 327668"/>
+              <a:gd name="connsiteY3" fmla="*/ 345519 h 416956"/>
+              <a:gd name="connsiteX4" fmla="*/ 42862 w 327668"/>
+              <a:gd name="connsiteY4" fmla="*/ 0 h 416956"/>
+              <a:gd name="connsiteX0" fmla="*/ 0 w 332431"/>
+              <a:gd name="connsiteY0" fmla="*/ 0 h 445531"/>
+              <a:gd name="connsiteX1" fmla="*/ 303855 w 332431"/>
+              <a:gd name="connsiteY1" fmla="*/ 138112 h 445531"/>
+              <a:gd name="connsiteX2" fmla="*/ 332431 w 332431"/>
+              <a:gd name="connsiteY2" fmla="*/ 445531 h 445531"/>
+              <a:gd name="connsiteX3" fmla="*/ 4763 w 332431"/>
+              <a:gd name="connsiteY3" fmla="*/ 374094 h 445531"/>
+              <a:gd name="connsiteX4" fmla="*/ 0 w 332431"/>
+              <a:gd name="connsiteY4" fmla="*/ 0 h 445531"/>
+              <a:gd name="connsiteX0" fmla="*/ 0 w 320525"/>
+              <a:gd name="connsiteY0" fmla="*/ 0 h 445531"/>
+              <a:gd name="connsiteX1" fmla="*/ 303855 w 320525"/>
+              <a:gd name="connsiteY1" fmla="*/ 138112 h 445531"/>
+              <a:gd name="connsiteX2" fmla="*/ 320525 w 320525"/>
+              <a:gd name="connsiteY2" fmla="*/ 445531 h 445531"/>
+              <a:gd name="connsiteX3" fmla="*/ 4763 w 320525"/>
+              <a:gd name="connsiteY3" fmla="*/ 374094 h 445531"/>
+              <a:gd name="connsiteX4" fmla="*/ 0 w 320525"/>
+              <a:gd name="connsiteY4" fmla="*/ 0 h 445531"/>
+              <a:gd name="connsiteX0" fmla="*/ 0 w 320981"/>
+              <a:gd name="connsiteY0" fmla="*/ 0 h 445531"/>
+              <a:gd name="connsiteX1" fmla="*/ 320523 w 320981"/>
+              <a:gd name="connsiteY1" fmla="*/ 176212 h 445531"/>
+              <a:gd name="connsiteX2" fmla="*/ 320525 w 320981"/>
+              <a:gd name="connsiteY2" fmla="*/ 445531 h 445531"/>
+              <a:gd name="connsiteX3" fmla="*/ 4763 w 320981"/>
+              <a:gd name="connsiteY3" fmla="*/ 374094 h 445531"/>
+              <a:gd name="connsiteX4" fmla="*/ 0 w 320981"/>
+              <a:gd name="connsiteY4" fmla="*/ 0 h 445531"/>
+              <a:gd name="connsiteX0" fmla="*/ 0 w 325497"/>
+              <a:gd name="connsiteY0" fmla="*/ 0 h 445531"/>
+              <a:gd name="connsiteX1" fmla="*/ 325286 w 325497"/>
+              <a:gd name="connsiteY1" fmla="*/ 159543 h 445531"/>
+              <a:gd name="connsiteX2" fmla="*/ 320525 w 325497"/>
+              <a:gd name="connsiteY2" fmla="*/ 445531 h 445531"/>
+              <a:gd name="connsiteX3" fmla="*/ 4763 w 325497"/>
+              <a:gd name="connsiteY3" fmla="*/ 374094 h 445531"/>
+              <a:gd name="connsiteX4" fmla="*/ 0 w 325497"/>
+              <a:gd name="connsiteY4" fmla="*/ 0 h 445531"/>
+              <a:gd name="connsiteX0" fmla="*/ 0 w 325497"/>
+              <a:gd name="connsiteY0" fmla="*/ 0 h 445531"/>
+              <a:gd name="connsiteX1" fmla="*/ 325286 w 325497"/>
+              <a:gd name="connsiteY1" fmla="*/ 157161 h 445531"/>
+              <a:gd name="connsiteX2" fmla="*/ 320525 w 325497"/>
+              <a:gd name="connsiteY2" fmla="*/ 445531 h 445531"/>
+              <a:gd name="connsiteX3" fmla="*/ 4763 w 325497"/>
+              <a:gd name="connsiteY3" fmla="*/ 374094 h 445531"/>
+              <a:gd name="connsiteX4" fmla="*/ 0 w 325497"/>
+              <a:gd name="connsiteY4" fmla="*/ 0 h 445531"/>
+              <a:gd name="connsiteX0" fmla="*/ 0 w 325497"/>
+              <a:gd name="connsiteY0" fmla="*/ 0 h 450293"/>
+              <a:gd name="connsiteX1" fmla="*/ 325286 w 325497"/>
+              <a:gd name="connsiteY1" fmla="*/ 157161 h 450293"/>
+              <a:gd name="connsiteX2" fmla="*/ 320525 w 325497"/>
+              <a:gd name="connsiteY2" fmla="*/ 450293 h 450293"/>
+              <a:gd name="connsiteX3" fmla="*/ 4763 w 325497"/>
+              <a:gd name="connsiteY3" fmla="*/ 374094 h 450293"/>
+              <a:gd name="connsiteX4" fmla="*/ 0 w 325497"/>
+              <a:gd name="connsiteY4" fmla="*/ 0 h 450293"/>
+              <a:gd name="connsiteX0" fmla="*/ 0 w 325497"/>
+              <a:gd name="connsiteY0" fmla="*/ 0 h 452675"/>
+              <a:gd name="connsiteX1" fmla="*/ 325286 w 325497"/>
+              <a:gd name="connsiteY1" fmla="*/ 159543 h 452675"/>
+              <a:gd name="connsiteX2" fmla="*/ 320525 w 325497"/>
+              <a:gd name="connsiteY2" fmla="*/ 452675 h 452675"/>
+              <a:gd name="connsiteX3" fmla="*/ 4763 w 325497"/>
+              <a:gd name="connsiteY3" fmla="*/ 376476 h 452675"/>
+              <a:gd name="connsiteX4" fmla="*/ 0 w 325497"/>
+              <a:gd name="connsiteY4" fmla="*/ 0 h 452675"/>
+              <a:gd name="connsiteX0" fmla="*/ 0 w 365805"/>
+              <a:gd name="connsiteY0" fmla="*/ 38101 h 490776"/>
+              <a:gd name="connsiteX1" fmla="*/ 365767 w 365805"/>
+              <a:gd name="connsiteY1" fmla="*/ 0 h 490776"/>
+              <a:gd name="connsiteX2" fmla="*/ 320525 w 365805"/>
+              <a:gd name="connsiteY2" fmla="*/ 490776 h 490776"/>
+              <a:gd name="connsiteX3" fmla="*/ 4763 w 365805"/>
+              <a:gd name="connsiteY3" fmla="*/ 414577 h 490776"/>
+              <a:gd name="connsiteX4" fmla="*/ 0 w 365805"/>
+              <a:gd name="connsiteY4" fmla="*/ 38101 h 490776"/>
+              <a:gd name="connsiteX0" fmla="*/ 0 w 368150"/>
+              <a:gd name="connsiteY0" fmla="*/ 38101 h 414577"/>
+              <a:gd name="connsiteX1" fmla="*/ 365767 w 368150"/>
+              <a:gd name="connsiteY1" fmla="*/ 0 h 414577"/>
+              <a:gd name="connsiteX2" fmla="*/ 368150 w 368150"/>
+              <a:gd name="connsiteY2" fmla="*/ 343139 h 414577"/>
+              <a:gd name="connsiteX3" fmla="*/ 4763 w 368150"/>
+              <a:gd name="connsiteY3" fmla="*/ 414577 h 414577"/>
+              <a:gd name="connsiteX4" fmla="*/ 0 w 368150"/>
+              <a:gd name="connsiteY4" fmla="*/ 38101 h 414577"/>
+              <a:gd name="connsiteX0" fmla="*/ 0 w 368150"/>
+              <a:gd name="connsiteY0" fmla="*/ 38101 h 414577"/>
+              <a:gd name="connsiteX1" fmla="*/ 365767 w 368150"/>
+              <a:gd name="connsiteY1" fmla="*/ 0 h 414577"/>
+              <a:gd name="connsiteX2" fmla="*/ 368150 w 368150"/>
+              <a:gd name="connsiteY2" fmla="*/ 359807 h 414577"/>
+              <a:gd name="connsiteX3" fmla="*/ 4763 w 368150"/>
+              <a:gd name="connsiteY3" fmla="*/ 414577 h 414577"/>
+              <a:gd name="connsiteX4" fmla="*/ 0 w 368150"/>
+              <a:gd name="connsiteY4" fmla="*/ 38101 h 414577"/>
+              <a:gd name="connsiteX0" fmla="*/ 21504 w 389654"/>
+              <a:gd name="connsiteY0" fmla="*/ 38101 h 443152"/>
+              <a:gd name="connsiteX1" fmla="*/ 387271 w 389654"/>
+              <a:gd name="connsiteY1" fmla="*/ 0 h 443152"/>
+              <a:gd name="connsiteX2" fmla="*/ 389654 w 389654"/>
+              <a:gd name="connsiteY2" fmla="*/ 359807 h 443152"/>
+              <a:gd name="connsiteX3" fmla="*/ 73 w 389654"/>
+              <a:gd name="connsiteY3" fmla="*/ 443152 h 443152"/>
+              <a:gd name="connsiteX4" fmla="*/ 21504 w 389654"/>
+              <a:gd name="connsiteY4" fmla="*/ 38101 h 443152"/>
+              <a:gd name="connsiteX0" fmla="*/ 0 w 391963"/>
+              <a:gd name="connsiteY0" fmla="*/ 145258 h 443152"/>
+              <a:gd name="connsiteX1" fmla="*/ 389580 w 391963"/>
+              <a:gd name="connsiteY1" fmla="*/ 0 h 443152"/>
+              <a:gd name="connsiteX2" fmla="*/ 391963 w 391963"/>
+              <a:gd name="connsiteY2" fmla="*/ 359807 h 443152"/>
+              <a:gd name="connsiteX3" fmla="*/ 2382 w 391963"/>
+              <a:gd name="connsiteY3" fmla="*/ 443152 h 443152"/>
+              <a:gd name="connsiteX4" fmla="*/ 0 w 391963"/>
+              <a:gd name="connsiteY4" fmla="*/ 145258 h 443152"/>
+              <a:gd name="connsiteX0" fmla="*/ 4974 w 389793"/>
+              <a:gd name="connsiteY0" fmla="*/ 142876 h 443152"/>
+              <a:gd name="connsiteX1" fmla="*/ 387410 w 389793"/>
+              <a:gd name="connsiteY1" fmla="*/ 0 h 443152"/>
+              <a:gd name="connsiteX2" fmla="*/ 389793 w 389793"/>
+              <a:gd name="connsiteY2" fmla="*/ 359807 h 443152"/>
+              <a:gd name="connsiteX3" fmla="*/ 212 w 389793"/>
+              <a:gd name="connsiteY3" fmla="*/ 443152 h 443152"/>
+              <a:gd name="connsiteX4" fmla="*/ 4974 w 389793"/>
+              <a:gd name="connsiteY4" fmla="*/ 142876 h 443152"/>
+              <a:gd name="connsiteX0" fmla="*/ 4974 w 389793"/>
+              <a:gd name="connsiteY0" fmla="*/ 157164 h 443152"/>
+              <a:gd name="connsiteX1" fmla="*/ 387410 w 389793"/>
+              <a:gd name="connsiteY1" fmla="*/ 0 h 443152"/>
+              <a:gd name="connsiteX2" fmla="*/ 389793 w 389793"/>
+              <a:gd name="connsiteY2" fmla="*/ 359807 h 443152"/>
+              <a:gd name="connsiteX3" fmla="*/ 212 w 389793"/>
+              <a:gd name="connsiteY3" fmla="*/ 443152 h 443152"/>
+              <a:gd name="connsiteX4" fmla="*/ 4974 w 389793"/>
+              <a:gd name="connsiteY4" fmla="*/ 157164 h 443152"/>
+              <a:gd name="connsiteX0" fmla="*/ 457 w 390039"/>
+              <a:gd name="connsiteY0" fmla="*/ 150020 h 443152"/>
+              <a:gd name="connsiteX1" fmla="*/ 387656 w 390039"/>
+              <a:gd name="connsiteY1" fmla="*/ 0 h 443152"/>
+              <a:gd name="connsiteX2" fmla="*/ 390039 w 390039"/>
+              <a:gd name="connsiteY2" fmla="*/ 359807 h 443152"/>
+              <a:gd name="connsiteX3" fmla="*/ 458 w 390039"/>
+              <a:gd name="connsiteY3" fmla="*/ 443152 h 443152"/>
+              <a:gd name="connsiteX4" fmla="*/ 457 w 390039"/>
+              <a:gd name="connsiteY4" fmla="*/ 150020 h 443152"/>
+              <a:gd name="connsiteX0" fmla="*/ 457 w 390039"/>
+              <a:gd name="connsiteY0" fmla="*/ 150020 h 443152"/>
+              <a:gd name="connsiteX1" fmla="*/ 387656 w 390039"/>
+              <a:gd name="connsiteY1" fmla="*/ 0 h 443152"/>
+              <a:gd name="connsiteX2" fmla="*/ 390039 w 390039"/>
+              <a:gd name="connsiteY2" fmla="*/ 352663 h 443152"/>
+              <a:gd name="connsiteX3" fmla="*/ 458 w 390039"/>
+              <a:gd name="connsiteY3" fmla="*/ 443152 h 443152"/>
+              <a:gd name="connsiteX4" fmla="*/ 457 w 390039"/>
+              <a:gd name="connsiteY4" fmla="*/ 150020 h 443152"/>
+              <a:gd name="connsiteX0" fmla="*/ 457 w 388114"/>
+              <a:gd name="connsiteY0" fmla="*/ 150020 h 443152"/>
+              <a:gd name="connsiteX1" fmla="*/ 387656 w 388114"/>
+              <a:gd name="connsiteY1" fmla="*/ 0 h 443152"/>
+              <a:gd name="connsiteX2" fmla="*/ 387658 w 388114"/>
+              <a:gd name="connsiteY2" fmla="*/ 345520 h 443152"/>
+              <a:gd name="connsiteX3" fmla="*/ 458 w 388114"/>
+              <a:gd name="connsiteY3" fmla="*/ 443152 h 443152"/>
+              <a:gd name="connsiteX4" fmla="*/ 457 w 388114"/>
+              <a:gd name="connsiteY4" fmla="*/ 150020 h 443152"/>
+              <a:gd name="connsiteX0" fmla="*/ 457 w 388114"/>
+              <a:gd name="connsiteY0" fmla="*/ 150020 h 443152"/>
+              <a:gd name="connsiteX1" fmla="*/ 387656 w 388114"/>
+              <a:gd name="connsiteY1" fmla="*/ 0 h 443152"/>
+              <a:gd name="connsiteX2" fmla="*/ 387658 w 388114"/>
+              <a:gd name="connsiteY2" fmla="*/ 347901 h 443152"/>
+              <a:gd name="connsiteX3" fmla="*/ 458 w 388114"/>
+              <a:gd name="connsiteY3" fmla="*/ 443152 h 443152"/>
+              <a:gd name="connsiteX4" fmla="*/ 457 w 388114"/>
+              <a:gd name="connsiteY4" fmla="*/ 150020 h 443152"/>
+              <a:gd name="connsiteX0" fmla="*/ 457 w 388114"/>
+              <a:gd name="connsiteY0" fmla="*/ 150020 h 443152"/>
+              <a:gd name="connsiteX1" fmla="*/ 387656 w 388114"/>
+              <a:gd name="connsiteY1" fmla="*/ 0 h 443152"/>
+              <a:gd name="connsiteX2" fmla="*/ 387658 w 388114"/>
+              <a:gd name="connsiteY2" fmla="*/ 352663 h 443152"/>
+              <a:gd name="connsiteX3" fmla="*/ 458 w 388114"/>
+              <a:gd name="connsiteY3" fmla="*/ 443152 h 443152"/>
+              <a:gd name="connsiteX4" fmla="*/ 457 w 388114"/>
+              <a:gd name="connsiteY4" fmla="*/ 150020 h 443152"/>
+              <a:gd name="connsiteX0" fmla="*/ 457 w 387658"/>
+              <a:gd name="connsiteY0" fmla="*/ 176214 h 469346"/>
+              <a:gd name="connsiteX1" fmla="*/ 382894 w 387658"/>
+              <a:gd name="connsiteY1" fmla="*/ 0 h 469346"/>
+              <a:gd name="connsiteX2" fmla="*/ 387658 w 387658"/>
+              <a:gd name="connsiteY2" fmla="*/ 378857 h 469346"/>
+              <a:gd name="connsiteX3" fmla="*/ 458 w 387658"/>
+              <a:gd name="connsiteY3" fmla="*/ 469346 h 469346"/>
+              <a:gd name="connsiteX4" fmla="*/ 457 w 387658"/>
+              <a:gd name="connsiteY4" fmla="*/ 176214 h 469346"/>
+              <a:gd name="connsiteX0" fmla="*/ 457 w 387658"/>
+              <a:gd name="connsiteY0" fmla="*/ 176214 h 471727"/>
+              <a:gd name="connsiteX1" fmla="*/ 382894 w 387658"/>
+              <a:gd name="connsiteY1" fmla="*/ 0 h 471727"/>
+              <a:gd name="connsiteX2" fmla="*/ 387658 w 387658"/>
+              <a:gd name="connsiteY2" fmla="*/ 378857 h 471727"/>
+              <a:gd name="connsiteX3" fmla="*/ 458 w 387658"/>
+              <a:gd name="connsiteY3" fmla="*/ 471727 h 471727"/>
+              <a:gd name="connsiteX4" fmla="*/ 457 w 387658"/>
+              <a:gd name="connsiteY4" fmla="*/ 176214 h 471727"/>
+              <a:gd name="connsiteX0" fmla="*/ 457 w 387658"/>
+              <a:gd name="connsiteY0" fmla="*/ 176214 h 471727"/>
+              <a:gd name="connsiteX1" fmla="*/ 382894 w 387658"/>
+              <a:gd name="connsiteY1" fmla="*/ 0 h 471727"/>
+              <a:gd name="connsiteX2" fmla="*/ 387658 w 387658"/>
+              <a:gd name="connsiteY2" fmla="*/ 378857 h 471727"/>
+              <a:gd name="connsiteX3" fmla="*/ 458 w 387658"/>
+              <a:gd name="connsiteY3" fmla="*/ 471727 h 471727"/>
+              <a:gd name="connsiteX4" fmla="*/ 457 w 387658"/>
+              <a:gd name="connsiteY4" fmla="*/ 176214 h 471727"/>
+              <a:gd name="connsiteX0" fmla="*/ 457 w 387658"/>
+              <a:gd name="connsiteY0" fmla="*/ 176214 h 471727"/>
+              <a:gd name="connsiteX1" fmla="*/ 382894 w 387658"/>
+              <a:gd name="connsiteY1" fmla="*/ 0 h 471727"/>
+              <a:gd name="connsiteX2" fmla="*/ 387658 w 387658"/>
+              <a:gd name="connsiteY2" fmla="*/ 376476 h 471727"/>
+              <a:gd name="connsiteX3" fmla="*/ 458 w 387658"/>
+              <a:gd name="connsiteY3" fmla="*/ 471727 h 471727"/>
+              <a:gd name="connsiteX4" fmla="*/ 457 w 387658"/>
+              <a:gd name="connsiteY4" fmla="*/ 176214 h 471727"/>
+              <a:gd name="connsiteX0" fmla="*/ 457 w 387658"/>
+              <a:gd name="connsiteY0" fmla="*/ 178595 h 474108"/>
+              <a:gd name="connsiteX1" fmla="*/ 382894 w 387658"/>
+              <a:gd name="connsiteY1" fmla="*/ 0 h 474108"/>
+              <a:gd name="connsiteX2" fmla="*/ 387658 w 387658"/>
+              <a:gd name="connsiteY2" fmla="*/ 378857 h 474108"/>
+              <a:gd name="connsiteX3" fmla="*/ 458 w 387658"/>
+              <a:gd name="connsiteY3" fmla="*/ 474108 h 474108"/>
+              <a:gd name="connsiteX4" fmla="*/ 457 w 387658"/>
+              <a:gd name="connsiteY4" fmla="*/ 178595 h 474108"/>
+            </a:gdLst>
+            <a:ahLst/>
+            <a:cxnLst>
+              <a:cxn ang="0">
+                <a:pos x="connsiteX0" y="connsiteY0"/>
+              </a:cxn>
+              <a:cxn ang="0">
+                <a:pos x="connsiteX1" y="connsiteY1"/>
+              </a:cxn>
+              <a:cxn ang="0">
+                <a:pos x="connsiteX2" y="connsiteY2"/>
+              </a:cxn>
+              <a:cxn ang="0">
+                <a:pos x="connsiteX3" y="connsiteY3"/>
+              </a:cxn>
+              <a:cxn ang="0">
+                <a:pos x="connsiteX4" y="connsiteY4"/>
+              </a:cxn>
+            </a:cxnLst>
+            <a:rect l="l" t="t" r="r" b="b"/>
+            <a:pathLst>
+              <a:path w="387658" h="474108">
+                <a:moveTo>
+                  <a:pt x="457" y="178595"/>
+                </a:moveTo>
+                <a:lnTo>
+                  <a:pt x="382894" y="0"/>
+                </a:lnTo>
+                <a:cubicBezTo>
+                  <a:pt x="384482" y="104061"/>
+                  <a:pt x="386070" y="274796"/>
+                  <a:pt x="387658" y="378857"/>
+                </a:cubicBezTo>
+                <a:lnTo>
+                  <a:pt x="458" y="474108"/>
+                </a:lnTo>
+                <a:cubicBezTo>
+                  <a:pt x="-1130" y="349410"/>
+                  <a:pt x="2045" y="303293"/>
+                  <a:pt x="457" y="178595"/>
+                </a:cubicBezTo>
+                <a:close/>
+              </a:path>
+            </a:pathLst>
+          </a:custGeom>
+          <a:solidFill>
+            <a:srgbClr val="0088B8"/>
+          </a:solidFill>
+        </p:spPr>
+        <p:txBody>
+          <a:bodyPr wrap="square" lIns="0" tIns="0" rIns="0" bIns="0" rtlCol="0">
+            <a:spAutoFit/>
+          </a:bodyPr>
+          <a:lstStyle/>
+          <a:p>
+            <a:endParaRPr lang="en-US" sz="2400" dirty="0">
+              <a:solidFill>
+                <a:schemeClr val="bg1"/>
+              </a:solidFill>
+            </a:endParaRPr>
+          </a:p>
+        </p:txBody>
+      </p:sp>
+      <p:sp>
+        <p:nvSpPr>
+          <p:cNvPr id="68" name="TextBox 67"/>
+          <p:cNvSpPr txBox="1"/>
+          <p:nvPr/>
+        </p:nvSpPr>
+        <p:spPr>
+          <a:xfrm>
+            <a:off x="3717688" y="11406141"/>
+            <a:ext cx="296828" cy="393143"/>
+          </a:xfrm>
+          <a:custGeom>
+            <a:avLst/>
+            <a:gdLst>
+              <a:gd name="connsiteX0" fmla="*/ 0 w 2137418"/>
+              <a:gd name="connsiteY0" fmla="*/ 0 h 369332"/>
+              <a:gd name="connsiteX1" fmla="*/ 2137418 w 2137418"/>
+              <a:gd name="connsiteY1" fmla="*/ 0 h 369332"/>
+              <a:gd name="connsiteX2" fmla="*/ 2137418 w 2137418"/>
+              <a:gd name="connsiteY2" fmla="*/ 369332 h 369332"/>
+              <a:gd name="connsiteX3" fmla="*/ 0 w 2137418"/>
+              <a:gd name="connsiteY3" fmla="*/ 369332 h 369332"/>
+              <a:gd name="connsiteX4" fmla="*/ 0 w 2137418"/>
+              <a:gd name="connsiteY4" fmla="*/ 0 h 369332"/>
+              <a:gd name="connsiteX0" fmla="*/ 0 w 2137418"/>
+              <a:gd name="connsiteY0" fmla="*/ 0 h 431244"/>
+              <a:gd name="connsiteX1" fmla="*/ 2137418 w 2137418"/>
+              <a:gd name="connsiteY1" fmla="*/ 0 h 431244"/>
+              <a:gd name="connsiteX2" fmla="*/ 299093 w 2137418"/>
+              <a:gd name="connsiteY2" fmla="*/ 431244 h 431244"/>
+              <a:gd name="connsiteX3" fmla="*/ 0 w 2137418"/>
+              <a:gd name="connsiteY3" fmla="*/ 369332 h 431244"/>
+              <a:gd name="connsiteX4" fmla="*/ 0 w 2137418"/>
+              <a:gd name="connsiteY4" fmla="*/ 0 h 431244"/>
+              <a:gd name="connsiteX0" fmla="*/ 0 w 313380"/>
+              <a:gd name="connsiteY0" fmla="*/ 0 h 431244"/>
+              <a:gd name="connsiteX1" fmla="*/ 313380 w 313380"/>
+              <a:gd name="connsiteY1" fmla="*/ 85725 h 431244"/>
+              <a:gd name="connsiteX2" fmla="*/ 299093 w 313380"/>
+              <a:gd name="connsiteY2" fmla="*/ 431244 h 431244"/>
+              <a:gd name="connsiteX3" fmla="*/ 0 w 313380"/>
+              <a:gd name="connsiteY3" fmla="*/ 369332 h 431244"/>
+              <a:gd name="connsiteX4" fmla="*/ 0 w 313380"/>
+              <a:gd name="connsiteY4" fmla="*/ 0 h 431244"/>
+              <a:gd name="connsiteX0" fmla="*/ 0 w 299093"/>
+              <a:gd name="connsiteY0" fmla="*/ 0 h 431244"/>
+              <a:gd name="connsiteX1" fmla="*/ 294330 w 299093"/>
+              <a:gd name="connsiteY1" fmla="*/ 119062 h 431244"/>
+              <a:gd name="connsiteX2" fmla="*/ 299093 w 299093"/>
+              <a:gd name="connsiteY2" fmla="*/ 431244 h 431244"/>
+              <a:gd name="connsiteX3" fmla="*/ 0 w 299093"/>
+              <a:gd name="connsiteY3" fmla="*/ 369332 h 431244"/>
+              <a:gd name="connsiteX4" fmla="*/ 0 w 299093"/>
+              <a:gd name="connsiteY4" fmla="*/ 0 h 431244"/>
+              <a:gd name="connsiteX0" fmla="*/ 0 w 318223"/>
+              <a:gd name="connsiteY0" fmla="*/ 0 h 431244"/>
+              <a:gd name="connsiteX1" fmla="*/ 318142 w 318223"/>
+              <a:gd name="connsiteY1" fmla="*/ 123825 h 431244"/>
+              <a:gd name="connsiteX2" fmla="*/ 299093 w 318223"/>
+              <a:gd name="connsiteY2" fmla="*/ 431244 h 431244"/>
+              <a:gd name="connsiteX3" fmla="*/ 0 w 318223"/>
+              <a:gd name="connsiteY3" fmla="*/ 369332 h 431244"/>
+              <a:gd name="connsiteX4" fmla="*/ 0 w 318223"/>
+              <a:gd name="connsiteY4" fmla="*/ 0 h 431244"/>
+              <a:gd name="connsiteX0" fmla="*/ 0 w 346718"/>
+              <a:gd name="connsiteY0" fmla="*/ 0 h 431244"/>
+              <a:gd name="connsiteX1" fmla="*/ 318142 w 346718"/>
+              <a:gd name="connsiteY1" fmla="*/ 123825 h 431244"/>
+              <a:gd name="connsiteX2" fmla="*/ 346718 w 346718"/>
+              <a:gd name="connsiteY2" fmla="*/ 431244 h 431244"/>
+              <a:gd name="connsiteX3" fmla="*/ 0 w 346718"/>
+              <a:gd name="connsiteY3" fmla="*/ 369332 h 431244"/>
+              <a:gd name="connsiteX4" fmla="*/ 0 w 346718"/>
+              <a:gd name="connsiteY4" fmla="*/ 0 h 431244"/>
+              <a:gd name="connsiteX0" fmla="*/ 0 w 346718"/>
+              <a:gd name="connsiteY0" fmla="*/ 0 h 431244"/>
+              <a:gd name="connsiteX1" fmla="*/ 318142 w 346718"/>
+              <a:gd name="connsiteY1" fmla="*/ 123825 h 431244"/>
+              <a:gd name="connsiteX2" fmla="*/ 346718 w 346718"/>
+              <a:gd name="connsiteY2" fmla="*/ 431244 h 431244"/>
+              <a:gd name="connsiteX3" fmla="*/ 19050 w 346718"/>
+              <a:gd name="connsiteY3" fmla="*/ 359807 h 431244"/>
+              <a:gd name="connsiteX4" fmla="*/ 0 w 346718"/>
+              <a:gd name="connsiteY4" fmla="*/ 0 h 431244"/>
+              <a:gd name="connsiteX0" fmla="*/ 42862 w 327668"/>
+              <a:gd name="connsiteY0" fmla="*/ 0 h 416956"/>
+              <a:gd name="connsiteX1" fmla="*/ 299092 w 327668"/>
+              <a:gd name="connsiteY1" fmla="*/ 109537 h 416956"/>
+              <a:gd name="connsiteX2" fmla="*/ 327668 w 327668"/>
+              <a:gd name="connsiteY2" fmla="*/ 416956 h 416956"/>
+              <a:gd name="connsiteX3" fmla="*/ 0 w 327668"/>
+              <a:gd name="connsiteY3" fmla="*/ 345519 h 416956"/>
+              <a:gd name="connsiteX4" fmla="*/ 42862 w 327668"/>
+              <a:gd name="connsiteY4" fmla="*/ 0 h 416956"/>
+              <a:gd name="connsiteX0" fmla="*/ 0 w 332431"/>
+              <a:gd name="connsiteY0" fmla="*/ 0 h 445531"/>
+              <a:gd name="connsiteX1" fmla="*/ 303855 w 332431"/>
+              <a:gd name="connsiteY1" fmla="*/ 138112 h 445531"/>
+              <a:gd name="connsiteX2" fmla="*/ 332431 w 332431"/>
+              <a:gd name="connsiteY2" fmla="*/ 445531 h 445531"/>
+              <a:gd name="connsiteX3" fmla="*/ 4763 w 332431"/>
+              <a:gd name="connsiteY3" fmla="*/ 374094 h 445531"/>
+              <a:gd name="connsiteX4" fmla="*/ 0 w 332431"/>
+              <a:gd name="connsiteY4" fmla="*/ 0 h 445531"/>
+              <a:gd name="connsiteX0" fmla="*/ 0 w 320525"/>
+              <a:gd name="connsiteY0" fmla="*/ 0 h 445531"/>
+              <a:gd name="connsiteX1" fmla="*/ 303855 w 320525"/>
+              <a:gd name="connsiteY1" fmla="*/ 138112 h 445531"/>
+              <a:gd name="connsiteX2" fmla="*/ 320525 w 320525"/>
+              <a:gd name="connsiteY2" fmla="*/ 445531 h 445531"/>
+              <a:gd name="connsiteX3" fmla="*/ 4763 w 320525"/>
+              <a:gd name="connsiteY3" fmla="*/ 374094 h 445531"/>
+              <a:gd name="connsiteX4" fmla="*/ 0 w 320525"/>
+              <a:gd name="connsiteY4" fmla="*/ 0 h 445531"/>
+              <a:gd name="connsiteX0" fmla="*/ 0 w 320981"/>
+              <a:gd name="connsiteY0" fmla="*/ 0 h 445531"/>
+              <a:gd name="connsiteX1" fmla="*/ 320523 w 320981"/>
+              <a:gd name="connsiteY1" fmla="*/ 176212 h 445531"/>
+              <a:gd name="connsiteX2" fmla="*/ 320525 w 320981"/>
+              <a:gd name="connsiteY2" fmla="*/ 445531 h 445531"/>
+              <a:gd name="connsiteX3" fmla="*/ 4763 w 320981"/>
+              <a:gd name="connsiteY3" fmla="*/ 374094 h 445531"/>
+              <a:gd name="connsiteX4" fmla="*/ 0 w 320981"/>
+              <a:gd name="connsiteY4" fmla="*/ 0 h 445531"/>
+              <a:gd name="connsiteX0" fmla="*/ 0 w 325497"/>
+              <a:gd name="connsiteY0" fmla="*/ 0 h 445531"/>
+              <a:gd name="connsiteX1" fmla="*/ 325286 w 325497"/>
+              <a:gd name="connsiteY1" fmla="*/ 159543 h 445531"/>
+              <a:gd name="connsiteX2" fmla="*/ 320525 w 325497"/>
+              <a:gd name="connsiteY2" fmla="*/ 445531 h 445531"/>
+              <a:gd name="connsiteX3" fmla="*/ 4763 w 325497"/>
+              <a:gd name="connsiteY3" fmla="*/ 374094 h 445531"/>
+              <a:gd name="connsiteX4" fmla="*/ 0 w 325497"/>
+              <a:gd name="connsiteY4" fmla="*/ 0 h 445531"/>
+              <a:gd name="connsiteX0" fmla="*/ 0 w 325497"/>
+              <a:gd name="connsiteY0" fmla="*/ 0 h 445531"/>
+              <a:gd name="connsiteX1" fmla="*/ 325286 w 325497"/>
+              <a:gd name="connsiteY1" fmla="*/ 157161 h 445531"/>
+              <a:gd name="connsiteX2" fmla="*/ 320525 w 325497"/>
+              <a:gd name="connsiteY2" fmla="*/ 445531 h 445531"/>
+              <a:gd name="connsiteX3" fmla="*/ 4763 w 325497"/>
+              <a:gd name="connsiteY3" fmla="*/ 374094 h 445531"/>
+              <a:gd name="connsiteX4" fmla="*/ 0 w 325497"/>
+              <a:gd name="connsiteY4" fmla="*/ 0 h 445531"/>
+              <a:gd name="connsiteX0" fmla="*/ 0 w 325497"/>
+              <a:gd name="connsiteY0" fmla="*/ 0 h 450293"/>
+              <a:gd name="connsiteX1" fmla="*/ 325286 w 325497"/>
+              <a:gd name="connsiteY1" fmla="*/ 157161 h 450293"/>
+              <a:gd name="connsiteX2" fmla="*/ 320525 w 325497"/>
+              <a:gd name="connsiteY2" fmla="*/ 450293 h 450293"/>
+              <a:gd name="connsiteX3" fmla="*/ 4763 w 325497"/>
+              <a:gd name="connsiteY3" fmla="*/ 374094 h 450293"/>
+              <a:gd name="connsiteX4" fmla="*/ 0 w 325497"/>
+              <a:gd name="connsiteY4" fmla="*/ 0 h 450293"/>
+              <a:gd name="connsiteX0" fmla="*/ 0 w 325497"/>
+              <a:gd name="connsiteY0" fmla="*/ 0 h 452675"/>
+              <a:gd name="connsiteX1" fmla="*/ 325286 w 325497"/>
+              <a:gd name="connsiteY1" fmla="*/ 159543 h 452675"/>
+              <a:gd name="connsiteX2" fmla="*/ 320525 w 325497"/>
+              <a:gd name="connsiteY2" fmla="*/ 452675 h 452675"/>
+              <a:gd name="connsiteX3" fmla="*/ 4763 w 325497"/>
+              <a:gd name="connsiteY3" fmla="*/ 376476 h 452675"/>
+              <a:gd name="connsiteX4" fmla="*/ 0 w 325497"/>
+              <a:gd name="connsiteY4" fmla="*/ 0 h 452675"/>
+              <a:gd name="connsiteX0" fmla="*/ 0 w 320525"/>
+              <a:gd name="connsiteY0" fmla="*/ 0 h 452675"/>
+              <a:gd name="connsiteX1" fmla="*/ 280043 w 320525"/>
+              <a:gd name="connsiteY1" fmla="*/ 80962 h 452675"/>
+              <a:gd name="connsiteX2" fmla="*/ 320525 w 320525"/>
+              <a:gd name="connsiteY2" fmla="*/ 452675 h 452675"/>
+              <a:gd name="connsiteX3" fmla="*/ 4763 w 320525"/>
+              <a:gd name="connsiteY3" fmla="*/ 376476 h 452675"/>
+              <a:gd name="connsiteX4" fmla="*/ 0 w 320525"/>
+              <a:gd name="connsiteY4" fmla="*/ 0 h 452675"/>
+              <a:gd name="connsiteX0" fmla="*/ 0 w 280133"/>
+              <a:gd name="connsiteY0" fmla="*/ 0 h 376476"/>
+              <a:gd name="connsiteX1" fmla="*/ 280043 w 280133"/>
+              <a:gd name="connsiteY1" fmla="*/ 80962 h 376476"/>
+              <a:gd name="connsiteX2" fmla="*/ 263375 w 280133"/>
+              <a:gd name="connsiteY2" fmla="*/ 359806 h 376476"/>
+              <a:gd name="connsiteX3" fmla="*/ 4763 w 280133"/>
+              <a:gd name="connsiteY3" fmla="*/ 376476 h 376476"/>
+              <a:gd name="connsiteX4" fmla="*/ 0 w 280133"/>
+              <a:gd name="connsiteY4" fmla="*/ 0 h 376476"/>
+              <a:gd name="connsiteX0" fmla="*/ 0 w 280145"/>
+              <a:gd name="connsiteY0" fmla="*/ 0 h 376476"/>
+              <a:gd name="connsiteX1" fmla="*/ 280043 w 280145"/>
+              <a:gd name="connsiteY1" fmla="*/ 80962 h 376476"/>
+              <a:gd name="connsiteX2" fmla="*/ 265757 w 280145"/>
+              <a:gd name="connsiteY2" fmla="*/ 374093 h 376476"/>
+              <a:gd name="connsiteX3" fmla="*/ 4763 w 280145"/>
+              <a:gd name="connsiteY3" fmla="*/ 376476 h 376476"/>
+              <a:gd name="connsiteX4" fmla="*/ 0 w 280145"/>
+              <a:gd name="connsiteY4" fmla="*/ 0 h 376476"/>
+              <a:gd name="connsiteX0" fmla="*/ 0 w 280145"/>
+              <a:gd name="connsiteY0" fmla="*/ 0 h 376476"/>
+              <a:gd name="connsiteX1" fmla="*/ 280043 w 280145"/>
+              <a:gd name="connsiteY1" fmla="*/ 80962 h 376476"/>
+              <a:gd name="connsiteX2" fmla="*/ 265757 w 280145"/>
+              <a:gd name="connsiteY2" fmla="*/ 374093 h 376476"/>
+              <a:gd name="connsiteX3" fmla="*/ 21432 w 280145"/>
+              <a:gd name="connsiteY3" fmla="*/ 376476 h 376476"/>
+              <a:gd name="connsiteX4" fmla="*/ 0 w 280145"/>
+              <a:gd name="connsiteY4" fmla="*/ 0 h 376476"/>
+              <a:gd name="connsiteX0" fmla="*/ 0 w 327770"/>
+              <a:gd name="connsiteY0" fmla="*/ 0 h 371713"/>
+              <a:gd name="connsiteX1" fmla="*/ 327668 w 327770"/>
+              <a:gd name="connsiteY1" fmla="*/ 76199 h 371713"/>
+              <a:gd name="connsiteX2" fmla="*/ 313382 w 327770"/>
+              <a:gd name="connsiteY2" fmla="*/ 369330 h 371713"/>
+              <a:gd name="connsiteX3" fmla="*/ 69057 w 327770"/>
+              <a:gd name="connsiteY3" fmla="*/ 371713 h 371713"/>
+              <a:gd name="connsiteX4" fmla="*/ 0 w 327770"/>
+              <a:gd name="connsiteY4" fmla="*/ 0 h 371713"/>
+              <a:gd name="connsiteX0" fmla="*/ 0 w 296813"/>
+              <a:gd name="connsiteY0" fmla="*/ 0 h 366950"/>
+              <a:gd name="connsiteX1" fmla="*/ 296711 w 296813"/>
+              <a:gd name="connsiteY1" fmla="*/ 71436 h 366950"/>
+              <a:gd name="connsiteX2" fmla="*/ 282425 w 296813"/>
+              <a:gd name="connsiteY2" fmla="*/ 364567 h 366950"/>
+              <a:gd name="connsiteX3" fmla="*/ 38100 w 296813"/>
+              <a:gd name="connsiteY3" fmla="*/ 366950 h 366950"/>
+              <a:gd name="connsiteX4" fmla="*/ 0 w 296813"/>
+              <a:gd name="connsiteY4" fmla="*/ 0 h 366950"/>
+              <a:gd name="connsiteX0" fmla="*/ 0 w 294446"/>
+              <a:gd name="connsiteY0" fmla="*/ 0 h 366950"/>
+              <a:gd name="connsiteX1" fmla="*/ 294329 w 294446"/>
+              <a:gd name="connsiteY1" fmla="*/ 64292 h 366950"/>
+              <a:gd name="connsiteX2" fmla="*/ 282425 w 294446"/>
+              <a:gd name="connsiteY2" fmla="*/ 364567 h 366950"/>
+              <a:gd name="connsiteX3" fmla="*/ 38100 w 294446"/>
+              <a:gd name="connsiteY3" fmla="*/ 366950 h 366950"/>
+              <a:gd name="connsiteX4" fmla="*/ 0 w 294446"/>
+              <a:gd name="connsiteY4" fmla="*/ 0 h 366950"/>
+              <a:gd name="connsiteX0" fmla="*/ 0 w 296828"/>
+              <a:gd name="connsiteY0" fmla="*/ 0 h 381237"/>
+              <a:gd name="connsiteX1" fmla="*/ 296711 w 296828"/>
+              <a:gd name="connsiteY1" fmla="*/ 78579 h 381237"/>
+              <a:gd name="connsiteX2" fmla="*/ 284807 w 296828"/>
+              <a:gd name="connsiteY2" fmla="*/ 378854 h 381237"/>
+              <a:gd name="connsiteX3" fmla="*/ 40482 w 296828"/>
+              <a:gd name="connsiteY3" fmla="*/ 381237 h 381237"/>
+              <a:gd name="connsiteX4" fmla="*/ 0 w 296828"/>
+              <a:gd name="connsiteY4" fmla="*/ 0 h 381237"/>
+              <a:gd name="connsiteX0" fmla="*/ 0 w 296828"/>
+              <a:gd name="connsiteY0" fmla="*/ 0 h 383618"/>
+              <a:gd name="connsiteX1" fmla="*/ 296711 w 296828"/>
+              <a:gd name="connsiteY1" fmla="*/ 78579 h 383618"/>
+              <a:gd name="connsiteX2" fmla="*/ 284807 w 296828"/>
+              <a:gd name="connsiteY2" fmla="*/ 378854 h 383618"/>
+              <a:gd name="connsiteX3" fmla="*/ 33339 w 296828"/>
+              <a:gd name="connsiteY3" fmla="*/ 383618 h 383618"/>
+              <a:gd name="connsiteX4" fmla="*/ 0 w 296828"/>
+              <a:gd name="connsiteY4" fmla="*/ 0 h 383618"/>
+              <a:gd name="connsiteX0" fmla="*/ 0 w 296828"/>
+              <a:gd name="connsiteY0" fmla="*/ 0 h 383618"/>
+              <a:gd name="connsiteX1" fmla="*/ 296711 w 296828"/>
+              <a:gd name="connsiteY1" fmla="*/ 66673 h 383618"/>
+              <a:gd name="connsiteX2" fmla="*/ 284807 w 296828"/>
+              <a:gd name="connsiteY2" fmla="*/ 378854 h 383618"/>
+              <a:gd name="connsiteX3" fmla="*/ 33339 w 296828"/>
+              <a:gd name="connsiteY3" fmla="*/ 383618 h 383618"/>
+              <a:gd name="connsiteX4" fmla="*/ 0 w 296828"/>
+              <a:gd name="connsiteY4" fmla="*/ 0 h 383618"/>
+              <a:gd name="connsiteX0" fmla="*/ 0 w 296828"/>
+              <a:gd name="connsiteY0" fmla="*/ 0 h 393143"/>
+              <a:gd name="connsiteX1" fmla="*/ 296711 w 296828"/>
+              <a:gd name="connsiteY1" fmla="*/ 76198 h 393143"/>
+              <a:gd name="connsiteX2" fmla="*/ 284807 w 296828"/>
+              <a:gd name="connsiteY2" fmla="*/ 388379 h 393143"/>
+              <a:gd name="connsiteX3" fmla="*/ 33339 w 296828"/>
+              <a:gd name="connsiteY3" fmla="*/ 393143 h 393143"/>
+              <a:gd name="connsiteX4" fmla="*/ 0 w 296828"/>
+              <a:gd name="connsiteY4" fmla="*/ 0 h 393143"/>
+            </a:gdLst>
+            <a:ahLst/>
+            <a:cxnLst>
+              <a:cxn ang="0">
+                <a:pos x="connsiteX0" y="connsiteY0"/>
+              </a:cxn>
+              <a:cxn ang="0">
+                <a:pos x="connsiteX1" y="connsiteY1"/>
+              </a:cxn>
+              <a:cxn ang="0">
+                <a:pos x="connsiteX2" y="connsiteY2"/>
+              </a:cxn>
+              <a:cxn ang="0">
+                <a:pos x="connsiteX3" y="connsiteY3"/>
+              </a:cxn>
+              <a:cxn ang="0">
+                <a:pos x="connsiteX4" y="connsiteY4"/>
+              </a:cxn>
+            </a:cxnLst>
+            <a:rect l="l" t="t" r="r" b="b"/>
+            <a:pathLst>
+              <a:path w="296828" h="393143">
+                <a:moveTo>
+                  <a:pt x="0" y="0"/>
+                </a:moveTo>
+                <a:lnTo>
+                  <a:pt x="296711" y="76198"/>
+                </a:lnTo>
+                <a:cubicBezTo>
+                  <a:pt x="298299" y="180259"/>
+                  <a:pt x="283219" y="284318"/>
+                  <a:pt x="284807" y="388379"/>
+                </a:cubicBezTo>
+                <a:lnTo>
+                  <a:pt x="33339" y="393143"/>
+                </a:lnTo>
+                <a:cubicBezTo>
+                  <a:pt x="31751" y="268445"/>
+                  <a:pt x="1588" y="124698"/>
+                  <a:pt x="0" y="0"/>
+                </a:cubicBezTo>
+                <a:close/>
+              </a:path>
+            </a:pathLst>
+          </a:custGeom>
+          <a:solidFill>
+            <a:srgbClr val="29A329"/>
+          </a:solidFill>
+        </p:spPr>
+        <p:txBody>
+          <a:bodyPr wrap="square" lIns="0" tIns="0" rIns="0" bIns="0" rtlCol="0">
+            <a:spAutoFit/>
+          </a:bodyPr>
+          <a:lstStyle/>
+          <a:p>
+            <a:endParaRPr lang="en-US" sz="2400" dirty="0">
+              <a:solidFill>
+                <a:schemeClr val="bg1"/>
+              </a:solidFill>
+            </a:endParaRPr>
+          </a:p>
+        </p:txBody>
+      </p:sp>
+      <p:sp>
+        <p:nvSpPr>
+          <p:cNvPr id="67" name="TextBox 66"/>
+          <p:cNvSpPr txBox="1"/>
+          <p:nvPr/>
+        </p:nvSpPr>
+        <p:spPr>
+          <a:xfrm>
+            <a:off x="3701710" y="11049318"/>
+            <a:ext cx="325497" cy="452675"/>
+          </a:xfrm>
+          <a:custGeom>
+            <a:avLst/>
+            <a:gdLst>
+              <a:gd name="connsiteX0" fmla="*/ 0 w 2137418"/>
+              <a:gd name="connsiteY0" fmla="*/ 0 h 369332"/>
+              <a:gd name="connsiteX1" fmla="*/ 2137418 w 2137418"/>
+              <a:gd name="connsiteY1" fmla="*/ 0 h 369332"/>
+              <a:gd name="connsiteX2" fmla="*/ 2137418 w 2137418"/>
+              <a:gd name="connsiteY2" fmla="*/ 369332 h 369332"/>
+              <a:gd name="connsiteX3" fmla="*/ 0 w 2137418"/>
+              <a:gd name="connsiteY3" fmla="*/ 369332 h 369332"/>
+              <a:gd name="connsiteX4" fmla="*/ 0 w 2137418"/>
+              <a:gd name="connsiteY4" fmla="*/ 0 h 369332"/>
+              <a:gd name="connsiteX0" fmla="*/ 0 w 2137418"/>
+              <a:gd name="connsiteY0" fmla="*/ 0 h 431244"/>
+              <a:gd name="connsiteX1" fmla="*/ 2137418 w 2137418"/>
+              <a:gd name="connsiteY1" fmla="*/ 0 h 431244"/>
+              <a:gd name="connsiteX2" fmla="*/ 299093 w 2137418"/>
+              <a:gd name="connsiteY2" fmla="*/ 431244 h 431244"/>
+              <a:gd name="connsiteX3" fmla="*/ 0 w 2137418"/>
+              <a:gd name="connsiteY3" fmla="*/ 369332 h 431244"/>
+              <a:gd name="connsiteX4" fmla="*/ 0 w 2137418"/>
+              <a:gd name="connsiteY4" fmla="*/ 0 h 431244"/>
+              <a:gd name="connsiteX0" fmla="*/ 0 w 313380"/>
+              <a:gd name="connsiteY0" fmla="*/ 0 h 431244"/>
+              <a:gd name="connsiteX1" fmla="*/ 313380 w 313380"/>
+              <a:gd name="connsiteY1" fmla="*/ 85725 h 431244"/>
+              <a:gd name="connsiteX2" fmla="*/ 299093 w 313380"/>
+              <a:gd name="connsiteY2" fmla="*/ 431244 h 431244"/>
+              <a:gd name="connsiteX3" fmla="*/ 0 w 313380"/>
+              <a:gd name="connsiteY3" fmla="*/ 369332 h 431244"/>
+              <a:gd name="connsiteX4" fmla="*/ 0 w 313380"/>
+              <a:gd name="connsiteY4" fmla="*/ 0 h 431244"/>
+              <a:gd name="connsiteX0" fmla="*/ 0 w 299093"/>
+              <a:gd name="connsiteY0" fmla="*/ 0 h 431244"/>
+              <a:gd name="connsiteX1" fmla="*/ 294330 w 299093"/>
+              <a:gd name="connsiteY1" fmla="*/ 119062 h 431244"/>
+              <a:gd name="connsiteX2" fmla="*/ 299093 w 299093"/>
+              <a:gd name="connsiteY2" fmla="*/ 431244 h 431244"/>
+              <a:gd name="connsiteX3" fmla="*/ 0 w 299093"/>
+              <a:gd name="connsiteY3" fmla="*/ 369332 h 431244"/>
+              <a:gd name="connsiteX4" fmla="*/ 0 w 299093"/>
+              <a:gd name="connsiteY4" fmla="*/ 0 h 431244"/>
+              <a:gd name="connsiteX0" fmla="*/ 0 w 318223"/>
+              <a:gd name="connsiteY0" fmla="*/ 0 h 431244"/>
+              <a:gd name="connsiteX1" fmla="*/ 318142 w 318223"/>
+              <a:gd name="connsiteY1" fmla="*/ 123825 h 431244"/>
+              <a:gd name="connsiteX2" fmla="*/ 299093 w 318223"/>
+              <a:gd name="connsiteY2" fmla="*/ 431244 h 431244"/>
+              <a:gd name="connsiteX3" fmla="*/ 0 w 318223"/>
+              <a:gd name="connsiteY3" fmla="*/ 369332 h 431244"/>
+              <a:gd name="connsiteX4" fmla="*/ 0 w 318223"/>
+              <a:gd name="connsiteY4" fmla="*/ 0 h 431244"/>
+              <a:gd name="connsiteX0" fmla="*/ 0 w 346718"/>
+              <a:gd name="connsiteY0" fmla="*/ 0 h 431244"/>
+              <a:gd name="connsiteX1" fmla="*/ 318142 w 346718"/>
+              <a:gd name="connsiteY1" fmla="*/ 123825 h 431244"/>
+              <a:gd name="connsiteX2" fmla="*/ 346718 w 346718"/>
+              <a:gd name="connsiteY2" fmla="*/ 431244 h 431244"/>
+              <a:gd name="connsiteX3" fmla="*/ 0 w 346718"/>
+              <a:gd name="connsiteY3" fmla="*/ 369332 h 431244"/>
+              <a:gd name="connsiteX4" fmla="*/ 0 w 346718"/>
+              <a:gd name="connsiteY4" fmla="*/ 0 h 431244"/>
+              <a:gd name="connsiteX0" fmla="*/ 0 w 346718"/>
+              <a:gd name="connsiteY0" fmla="*/ 0 h 431244"/>
+              <a:gd name="connsiteX1" fmla="*/ 318142 w 346718"/>
+              <a:gd name="connsiteY1" fmla="*/ 123825 h 431244"/>
+              <a:gd name="connsiteX2" fmla="*/ 346718 w 346718"/>
+              <a:gd name="connsiteY2" fmla="*/ 431244 h 431244"/>
+              <a:gd name="connsiteX3" fmla="*/ 19050 w 346718"/>
+              <a:gd name="connsiteY3" fmla="*/ 359807 h 431244"/>
+              <a:gd name="connsiteX4" fmla="*/ 0 w 346718"/>
+              <a:gd name="connsiteY4" fmla="*/ 0 h 431244"/>
+              <a:gd name="connsiteX0" fmla="*/ 42862 w 327668"/>
+              <a:gd name="connsiteY0" fmla="*/ 0 h 416956"/>
+              <a:gd name="connsiteX1" fmla="*/ 299092 w 327668"/>
+              <a:gd name="connsiteY1" fmla="*/ 109537 h 416956"/>
+              <a:gd name="connsiteX2" fmla="*/ 327668 w 327668"/>
+              <a:gd name="connsiteY2" fmla="*/ 416956 h 416956"/>
+              <a:gd name="connsiteX3" fmla="*/ 0 w 327668"/>
+              <a:gd name="connsiteY3" fmla="*/ 345519 h 416956"/>
+              <a:gd name="connsiteX4" fmla="*/ 42862 w 327668"/>
+              <a:gd name="connsiteY4" fmla="*/ 0 h 416956"/>
+              <a:gd name="connsiteX0" fmla="*/ 0 w 332431"/>
+              <a:gd name="connsiteY0" fmla="*/ 0 h 445531"/>
+              <a:gd name="connsiteX1" fmla="*/ 303855 w 332431"/>
+              <a:gd name="connsiteY1" fmla="*/ 138112 h 445531"/>
+              <a:gd name="connsiteX2" fmla="*/ 332431 w 332431"/>
+              <a:gd name="connsiteY2" fmla="*/ 445531 h 445531"/>
+              <a:gd name="connsiteX3" fmla="*/ 4763 w 332431"/>
+              <a:gd name="connsiteY3" fmla="*/ 374094 h 445531"/>
+              <a:gd name="connsiteX4" fmla="*/ 0 w 332431"/>
+              <a:gd name="connsiteY4" fmla="*/ 0 h 445531"/>
+              <a:gd name="connsiteX0" fmla="*/ 0 w 320525"/>
+              <a:gd name="connsiteY0" fmla="*/ 0 h 445531"/>
+              <a:gd name="connsiteX1" fmla="*/ 303855 w 320525"/>
+              <a:gd name="connsiteY1" fmla="*/ 138112 h 445531"/>
+              <a:gd name="connsiteX2" fmla="*/ 320525 w 320525"/>
+              <a:gd name="connsiteY2" fmla="*/ 445531 h 445531"/>
+              <a:gd name="connsiteX3" fmla="*/ 4763 w 320525"/>
+              <a:gd name="connsiteY3" fmla="*/ 374094 h 445531"/>
+              <a:gd name="connsiteX4" fmla="*/ 0 w 320525"/>
+              <a:gd name="connsiteY4" fmla="*/ 0 h 445531"/>
+              <a:gd name="connsiteX0" fmla="*/ 0 w 320981"/>
+              <a:gd name="connsiteY0" fmla="*/ 0 h 445531"/>
+              <a:gd name="connsiteX1" fmla="*/ 320523 w 320981"/>
+              <a:gd name="connsiteY1" fmla="*/ 176212 h 445531"/>
+              <a:gd name="connsiteX2" fmla="*/ 320525 w 320981"/>
+              <a:gd name="connsiteY2" fmla="*/ 445531 h 445531"/>
+              <a:gd name="connsiteX3" fmla="*/ 4763 w 320981"/>
+              <a:gd name="connsiteY3" fmla="*/ 374094 h 445531"/>
+              <a:gd name="connsiteX4" fmla="*/ 0 w 320981"/>
+              <a:gd name="connsiteY4" fmla="*/ 0 h 445531"/>
+              <a:gd name="connsiteX0" fmla="*/ 0 w 325497"/>
+              <a:gd name="connsiteY0" fmla="*/ 0 h 445531"/>
+              <a:gd name="connsiteX1" fmla="*/ 325286 w 325497"/>
+              <a:gd name="connsiteY1" fmla="*/ 159543 h 445531"/>
+              <a:gd name="connsiteX2" fmla="*/ 320525 w 325497"/>
+              <a:gd name="connsiteY2" fmla="*/ 445531 h 445531"/>
+              <a:gd name="connsiteX3" fmla="*/ 4763 w 325497"/>
+              <a:gd name="connsiteY3" fmla="*/ 374094 h 445531"/>
+              <a:gd name="connsiteX4" fmla="*/ 0 w 325497"/>
+              <a:gd name="connsiteY4" fmla="*/ 0 h 445531"/>
+              <a:gd name="connsiteX0" fmla="*/ 0 w 325497"/>
+              <a:gd name="connsiteY0" fmla="*/ 0 h 445531"/>
+              <a:gd name="connsiteX1" fmla="*/ 325286 w 325497"/>
+              <a:gd name="connsiteY1" fmla="*/ 157161 h 445531"/>
+              <a:gd name="connsiteX2" fmla="*/ 320525 w 325497"/>
+              <a:gd name="connsiteY2" fmla="*/ 445531 h 445531"/>
+              <a:gd name="connsiteX3" fmla="*/ 4763 w 325497"/>
+              <a:gd name="connsiteY3" fmla="*/ 374094 h 445531"/>
+              <a:gd name="connsiteX4" fmla="*/ 0 w 325497"/>
+              <a:gd name="connsiteY4" fmla="*/ 0 h 445531"/>
+              <a:gd name="connsiteX0" fmla="*/ 0 w 325497"/>
+              <a:gd name="connsiteY0" fmla="*/ 0 h 450293"/>
+              <a:gd name="connsiteX1" fmla="*/ 325286 w 325497"/>
+              <a:gd name="connsiteY1" fmla="*/ 157161 h 450293"/>
+              <a:gd name="connsiteX2" fmla="*/ 320525 w 325497"/>
+              <a:gd name="connsiteY2" fmla="*/ 450293 h 450293"/>
+              <a:gd name="connsiteX3" fmla="*/ 4763 w 325497"/>
+              <a:gd name="connsiteY3" fmla="*/ 374094 h 450293"/>
+              <a:gd name="connsiteX4" fmla="*/ 0 w 325497"/>
+              <a:gd name="connsiteY4" fmla="*/ 0 h 450293"/>
+              <a:gd name="connsiteX0" fmla="*/ 0 w 325497"/>
+              <a:gd name="connsiteY0" fmla="*/ 0 h 452675"/>
+              <a:gd name="connsiteX1" fmla="*/ 325286 w 325497"/>
+              <a:gd name="connsiteY1" fmla="*/ 159543 h 452675"/>
+              <a:gd name="connsiteX2" fmla="*/ 320525 w 325497"/>
+              <a:gd name="connsiteY2" fmla="*/ 452675 h 452675"/>
+              <a:gd name="connsiteX3" fmla="*/ 4763 w 325497"/>
+              <a:gd name="connsiteY3" fmla="*/ 376476 h 452675"/>
+              <a:gd name="connsiteX4" fmla="*/ 0 w 325497"/>
+              <a:gd name="connsiteY4" fmla="*/ 0 h 452675"/>
+            </a:gdLst>
+            <a:ahLst/>
+            <a:cxnLst>
+              <a:cxn ang="0">
+                <a:pos x="connsiteX0" y="connsiteY0"/>
+              </a:cxn>
+              <a:cxn ang="0">
+                <a:pos x="connsiteX1" y="connsiteY1"/>
+              </a:cxn>
+              <a:cxn ang="0">
+                <a:pos x="connsiteX2" y="connsiteY2"/>
+              </a:cxn>
+              <a:cxn ang="0">
+                <a:pos x="connsiteX3" y="connsiteY3"/>
+              </a:cxn>
+              <a:cxn ang="0">
+                <a:pos x="connsiteX4" y="connsiteY4"/>
+              </a:cxn>
+            </a:cxnLst>
+            <a:rect l="l" t="t" r="r" b="b"/>
+            <a:pathLst>
+              <a:path w="325497" h="452675">
+                <a:moveTo>
+                  <a:pt x="0" y="0"/>
+                </a:moveTo>
+                <a:lnTo>
+                  <a:pt x="325286" y="159543"/>
+                </a:lnTo>
+                <a:cubicBezTo>
+                  <a:pt x="326874" y="263604"/>
+                  <a:pt x="318937" y="348614"/>
+                  <a:pt x="320525" y="452675"/>
+                </a:cubicBezTo>
+                <a:lnTo>
+                  <a:pt x="4763" y="376476"/>
+                </a:lnTo>
+                <a:cubicBezTo>
+                  <a:pt x="3175" y="251778"/>
+                  <a:pt x="1588" y="124698"/>
+                  <a:pt x="0" y="0"/>
+                </a:cubicBezTo>
+                <a:close/>
+              </a:path>
+            </a:pathLst>
+          </a:custGeom>
+          <a:solidFill>
+            <a:srgbClr val="0088B8"/>
+          </a:solidFill>
+        </p:spPr>
+        <p:txBody>
+          <a:bodyPr wrap="square" lIns="0" tIns="0" rIns="0" bIns="0" rtlCol="0">
+            <a:spAutoFit/>
+          </a:bodyPr>
+          <a:lstStyle/>
+          <a:p>
+            <a:endParaRPr lang="en-US" sz="2400" dirty="0">
+              <a:solidFill>
+                <a:schemeClr val="bg1"/>
+              </a:solidFill>
+            </a:endParaRPr>
+          </a:p>
+        </p:txBody>
+      </p:sp>
       <p:pic>
         <p:nvPicPr>
           <p:cNvPr id="2" name="Picture 1"/>
@@ -3207,7 +4585,7 @@
         </p:nvSpPr>
         <p:spPr>
           <a:xfrm>
-            <a:off x="17567975" y="6124224"/>
+            <a:off x="17567975" y="6131844"/>
             <a:ext cx="2137418" cy="369332"/>
           </a:xfrm>
           <a:prstGeom prst="rect">
@@ -3390,7 +4768,7 @@
         <p:spPr>
           <a:xfrm>
             <a:off x="1622404" y="11430741"/>
-            <a:ext cx="2899844" cy="369332"/>
+            <a:ext cx="2137417" cy="369332"/>
           </a:xfrm>
           <a:prstGeom prst="rect">
             <a:avLst/>
@@ -3427,7 +4805,15 @@
                   <a:schemeClr val="bg1"/>
                 </a:solidFill>
               </a:rPr>
-              <a:t>RX / ADC2 / PPM</a:t>
+              <a:t>RX / </a:t>
+            </a:r>
+            <a:r>
+              <a:rPr lang="en-US" sz="2400" dirty="0" smtClean="0">
+                <a:solidFill>
+                  <a:schemeClr val="bg1"/>
+                </a:solidFill>
+              </a:rPr>
+              <a:t>ADC2</a:t>
             </a:r>
             <a:endParaRPr lang="en-US" sz="2400" dirty="0">
               <a:solidFill>
@@ -4048,7 +5434,15 @@
                   <a:srgbClr val="0088B8"/>
                 </a:solidFill>
               </a:rPr>
-              <a:t>Right Sideboard</a:t>
+              <a:t>Right </a:t>
+            </a:r>
+            <a:r>
+              <a:rPr lang="en-US" sz="2400" b="1" dirty="0" smtClean="0">
+                <a:solidFill>
+                  <a:srgbClr val="0088B8"/>
+                </a:solidFill>
+              </a:rPr>
+              <a:t>Sideboard*</a:t>
             </a:r>
             <a:endParaRPr lang="en-US" sz="2400" b="1" dirty="0">
               <a:solidFill>
@@ -5334,10 +6728,226 @@
           </a:p>
         </p:txBody>
       </p:sp>
+      <p:sp>
+        <p:nvSpPr>
+          <p:cNvPr id="60" name="TextBox 59"/>
+          <p:cNvSpPr txBox="1"/>
+          <p:nvPr/>
+        </p:nvSpPr>
+        <p:spPr>
+          <a:xfrm>
+            <a:off x="3974000" y="11487291"/>
+            <a:ext cx="2115933" cy="307777"/>
+          </a:xfrm>
+          <a:prstGeom prst="rect">
+            <a:avLst/>
+          </a:prstGeom>
+          <a:solidFill>
+            <a:srgbClr val="29A329"/>
+          </a:solidFill>
+        </p:spPr>
+        <p:txBody>
+          <a:bodyPr wrap="square" lIns="0" tIns="0" rIns="0" bIns="0" rtlCol="0">
+            <a:spAutoFit/>
+          </a:bodyPr>
+          <a:lstStyle/>
+          <a:p>
+            <a:r>
+              <a:rPr lang="en-US" sz="2000" dirty="0" smtClean="0">
+                <a:solidFill>
+                  <a:schemeClr val="bg1"/>
+                </a:solidFill>
+              </a:rPr>
+              <a:t>PWM2 / PPM / </a:t>
+            </a:r>
+            <a:r>
+              <a:rPr lang="en-US" sz="2000" dirty="0" err="1" smtClean="0">
+                <a:solidFill>
+                  <a:schemeClr val="bg1"/>
+                </a:solidFill>
+              </a:rPr>
+              <a:t>iBUS</a:t>
+            </a:r>
+            <a:endParaRPr lang="en-US" sz="2000" dirty="0">
+              <a:solidFill>
+                <a:schemeClr val="bg1"/>
+              </a:solidFill>
+            </a:endParaRPr>
+          </a:p>
+        </p:txBody>
+      </p:sp>
+      <p:sp>
+        <p:nvSpPr>
+          <p:cNvPr id="61" name="TextBox 60"/>
+          <p:cNvSpPr txBox="1"/>
+          <p:nvPr/>
+        </p:nvSpPr>
+        <p:spPr>
+          <a:xfrm>
+            <a:off x="3973999" y="11181511"/>
+            <a:ext cx="2115934" cy="307777"/>
+          </a:xfrm>
+          <a:prstGeom prst="rect">
+            <a:avLst/>
+          </a:prstGeom>
+          <a:solidFill>
+            <a:srgbClr val="0088B8"/>
+          </a:solidFill>
+        </p:spPr>
+        <p:txBody>
+          <a:bodyPr wrap="square" lIns="0" tIns="0" rIns="0" bIns="0" rtlCol="0">
+            <a:spAutoFit/>
+          </a:bodyPr>
+          <a:lstStyle/>
+          <a:p>
+            <a:r>
+              <a:rPr lang="en-US" sz="2000" dirty="0" smtClean="0">
+                <a:solidFill>
+                  <a:schemeClr val="bg1"/>
+                </a:solidFill>
+              </a:rPr>
+              <a:t>PWM1</a:t>
+            </a:r>
+            <a:endParaRPr lang="en-US" sz="2000" dirty="0">
+              <a:solidFill>
+                <a:schemeClr val="bg1"/>
+              </a:solidFill>
+            </a:endParaRPr>
+          </a:p>
+        </p:txBody>
+      </p:sp>
+      <p:sp>
+        <p:nvSpPr>
+          <p:cNvPr id="62" name="TextBox 61"/>
+          <p:cNvSpPr txBox="1"/>
+          <p:nvPr/>
+        </p:nvSpPr>
+        <p:spPr>
+          <a:xfrm>
+            <a:off x="15223309" y="11489288"/>
+            <a:ext cx="2115932" cy="307777"/>
+          </a:xfrm>
+          <a:prstGeom prst="rect">
+            <a:avLst/>
+          </a:prstGeom>
+          <a:solidFill>
+            <a:srgbClr val="29A329"/>
+          </a:solidFill>
+        </p:spPr>
+        <p:txBody>
+          <a:bodyPr wrap="square" lIns="0" tIns="0" rIns="0" bIns="0" rtlCol="0">
+            <a:spAutoFit/>
+          </a:bodyPr>
+          <a:lstStyle/>
+          <a:p>
+            <a:pPr algn="r"/>
+            <a:r>
+              <a:rPr lang="en-US" sz="2000" dirty="0" err="1" smtClean="0">
+                <a:solidFill>
+                  <a:schemeClr val="bg1"/>
+                </a:solidFill>
+              </a:rPr>
+              <a:t>iBUS</a:t>
+            </a:r>
+            <a:r>
+              <a:rPr lang="en-US" sz="2000" dirty="0" smtClean="0">
+                <a:solidFill>
+                  <a:schemeClr val="bg1"/>
+                </a:solidFill>
+              </a:rPr>
+              <a:t> / PPM / PWM2</a:t>
+            </a:r>
+            <a:endParaRPr lang="en-US" sz="2000" dirty="0">
+              <a:solidFill>
+                <a:schemeClr val="bg1"/>
+              </a:solidFill>
+            </a:endParaRPr>
+          </a:p>
+        </p:txBody>
+      </p:sp>
+      <p:sp>
+        <p:nvSpPr>
+          <p:cNvPr id="64" name="TextBox 63"/>
+          <p:cNvSpPr txBox="1"/>
+          <p:nvPr/>
+        </p:nvSpPr>
+        <p:spPr>
+          <a:xfrm>
+            <a:off x="15223308" y="11183508"/>
+            <a:ext cx="2115933" cy="307777"/>
+          </a:xfrm>
+          <a:prstGeom prst="rect">
+            <a:avLst/>
+          </a:prstGeom>
+          <a:solidFill>
+            <a:srgbClr val="0088B8"/>
+          </a:solidFill>
+        </p:spPr>
+        <p:txBody>
+          <a:bodyPr wrap="square" lIns="0" tIns="0" rIns="0" bIns="0" rtlCol="0">
+            <a:spAutoFit/>
+          </a:bodyPr>
+          <a:lstStyle/>
+          <a:p>
+            <a:pPr algn="r"/>
+            <a:r>
+              <a:rPr lang="en-US" sz="2000" dirty="0" smtClean="0">
+                <a:solidFill>
+                  <a:schemeClr val="bg1"/>
+                </a:solidFill>
+              </a:rPr>
+              <a:t>PWM1</a:t>
+            </a:r>
+            <a:endParaRPr lang="en-US" sz="2000" dirty="0">
+              <a:solidFill>
+                <a:schemeClr val="bg1"/>
+              </a:solidFill>
+            </a:endParaRPr>
+          </a:p>
+        </p:txBody>
+      </p:sp>
+      <p:sp>
+        <p:nvSpPr>
+          <p:cNvPr id="72" name="TextBox 71"/>
+          <p:cNvSpPr txBox="1"/>
+          <p:nvPr/>
+        </p:nvSpPr>
+        <p:spPr>
+          <a:xfrm>
+            <a:off x="15175839" y="11829206"/>
+            <a:ext cx="2212979" cy="307777"/>
+          </a:xfrm>
+          <a:prstGeom prst="rect">
+            <a:avLst/>
+          </a:prstGeom>
+          <a:noFill/>
+        </p:spPr>
+        <p:txBody>
+          <a:bodyPr wrap="square" lIns="0" tIns="0" rIns="0" bIns="0" rtlCol="0">
+            <a:spAutoFit/>
+          </a:bodyPr>
+          <a:lstStyle/>
+          <a:p>
+            <a:r>
+              <a:rPr lang="en-US" sz="2000" b="1" dirty="0" smtClean="0">
+                <a:solidFill>
+                  <a:srgbClr val="0088B8"/>
+                </a:solidFill>
+              </a:rPr>
+              <a:t> *5V Tolerant</a:t>
+            </a:r>
+            <a:endParaRPr lang="en-US" sz="2000" b="1" dirty="0">
+              <a:solidFill>
+                <a:srgbClr val="0088B8"/>
+              </a:solidFill>
+            </a:endParaRPr>
+          </a:p>
+        </p:txBody>
+      </p:sp>
     </p:spTree>
     <p:extLst>
       <p:ext uri="{BB962C8B-B14F-4D97-AF65-F5344CB8AC3E}">
-        <p14:creationId xmlns:p14="http://schemas.microsoft.com/office/powerpoint/2010/main" val="3331281797"/>
+        <p14:creationId xmlns:p14="http://schemas.microsoft.com/office/powerpoint/2010/main" val="4077038177"/>
       </p:ext>
     </p:extLst>
   </p:cSld>

</xml_diff>